<commit_message>
Update .NET 10 and C# 14 presentation slides
Modified Whats New in .NET 10 and C# 14.pptx with changes to slide content. Specific details of the updates are not available, but the binary file was altered, indicating additions, removals, or edits to the presentation.
</commit_message>
<xml_diff>
--- a/docs/Whats New in .NET 10 and C# 14.pptx
+++ b/docs/Whats New in .NET 10 and C# 14.pptx
@@ -6,21 +6,17 @@
     <p:sldMasterId id="2147483707" r:id="rId2"/>
   </p:sldMasterIdLst>
   <p:notesMasterIdLst>
-    <p:notesMasterId r:id="rId15"/>
+    <p:notesMasterId r:id="rId11"/>
   </p:notesMasterIdLst>
   <p:sldIdLst>
     <p:sldId id="398" r:id="rId3"/>
     <p:sldId id="2147483622" r:id="rId4"/>
     <p:sldId id="2147479619" r:id="rId5"/>
     <p:sldId id="2147483624" r:id="rId6"/>
-    <p:sldId id="2147479613" r:id="rId7"/>
-    <p:sldId id="421" r:id="rId8"/>
-    <p:sldId id="2147483630" r:id="rId9"/>
-    <p:sldId id="2147483629" r:id="rId10"/>
-    <p:sldId id="2147483631" r:id="rId11"/>
-    <p:sldId id="2147483627" r:id="rId12"/>
-    <p:sldId id="2147479636" r:id="rId13"/>
-    <p:sldId id="2147483625" r:id="rId14"/>
+    <p:sldId id="2147483632" r:id="rId7"/>
+    <p:sldId id="2147483627" r:id="rId8"/>
+    <p:sldId id="2147479636" r:id="rId9"/>
+    <p:sldId id="2147483625" r:id="rId10"/>
   </p:sldIdLst>
   <p:sldSz cx="24387175" cy="13716000"/>
   <p:notesSz cx="13716000" cy="24387175"/>
@@ -127,7 +123,7 @@
 <file path=ppt/revisionInfo.xml><?xml version="1.0" encoding="utf-8"?>
 <p1510:revInfo xmlns:a="http://schemas.openxmlformats.org/drawingml/2006/main" xmlns:r="http://schemas.openxmlformats.org/officeDocument/2006/relationships" xmlns:p1510="http://schemas.microsoft.com/office/powerpoint/2015/10/main">
   <p1510:revLst>
-    <p1510:client id="{991119B4-3FC9-5049-9135-516B1A28D263}" v="37" dt="2025-11-10T13:33:33.678"/>
+    <p1510:client id="{D2DEE2BB-7CEE-4D1F-AC67-A8FE4F0D85E1}" v="16" dt="2026-02-11T11:16:04.290"/>
   </p1510:revLst>
 </p1510:revInfo>
 </file>
@@ -402,7 +398,7 @@
           <a:p>
             <a:fld id="{2D91FF38-03BF-E345-8DFA-92A7B1D66F0D}" type="datetime8">
               <a:rPr lang="en-US" smtClean="0"/>
-              <a:t>2/10/2026 5:43 PM</a:t>
+              <a:t>2/12/2026 10:09 AM</a:t>
             </a:fld>
             <a:endParaRPr lang="en-US"/>
           </a:p>
@@ -450,7 +446,13 @@
   <p:cSld>
     <p:spTree>
       <p:nvGrpSpPr>
-        <p:cNvPr id="1" name=""/>
+        <p:cNvPr id="1" name="">
+          <a:extLst>
+            <a:ext uri="{FF2B5EF4-FFF2-40B4-BE49-F238E27FC236}">
+              <a16:creationId xmlns:a16="http://schemas.microsoft.com/office/drawing/2014/main" id="{3F4EDC52-570B-24BF-9A95-1078B04C95C2}"/>
+            </a:ext>
+          </a:extLst>
+        </p:cNvPr>
         <p:cNvGrpSpPr/>
         <p:nvPr/>
       </p:nvGrpSpPr>
@@ -464,7 +466,13 @@
       </p:grpSpPr>
       <p:sp>
         <p:nvSpPr>
-          <p:cNvPr id="2" name="Slide Image Placeholder 1"/>
+          <p:cNvPr id="2" name="Slide Image Placeholder 1">
+            <a:extLst>
+              <a:ext uri="{FF2B5EF4-FFF2-40B4-BE49-F238E27FC236}">
+                <a16:creationId xmlns:a16="http://schemas.microsoft.com/office/drawing/2014/main" id="{04067818-716E-6F92-1E0A-CD87635155D1}"/>
+              </a:ext>
+            </a:extLst>
+          </p:cNvPr>
           <p:cNvSpPr>
             <a:spLocks noGrp="1" noRot="1" noChangeAspect="1"/>
           </p:cNvSpPr>
@@ -476,7 +484,13 @@
       </p:sp>
       <p:sp>
         <p:nvSpPr>
-          <p:cNvPr id="3" name="Notes Placeholder 2"/>
+          <p:cNvPr id="3" name="Notes Placeholder 2">
+            <a:extLst>
+              <a:ext uri="{FF2B5EF4-FFF2-40B4-BE49-F238E27FC236}">
+                <a16:creationId xmlns:a16="http://schemas.microsoft.com/office/drawing/2014/main" id="{31062A1F-17A0-29B1-1779-4F3B2F33D22B}"/>
+              </a:ext>
+            </a:extLst>
+          </p:cNvPr>
           <p:cNvSpPr>
             <a:spLocks noGrp="1"/>
           </p:cNvSpPr>
@@ -489,105 +503,42 @@
           <a:bodyPr/>
           <a:lstStyle/>
           <a:p>
-            <a:pPr marL="0" marR="0">
+            <a:pPr marL="0" marR="0" lvl="0" indent="0" algn="l" defTabSz="914367" rtl="0" eaLnBrk="1" fontAlgn="auto" latinLnBrk="0" hangingPunct="1">
               <a:lnSpc>
-                <a:spcPct val="115000"/>
+                <a:spcPct val="90000"/>
               </a:lnSpc>
+              <a:spcBef>
+                <a:spcPts val="0"/>
+              </a:spcBef>
               <a:spcAft>
-                <a:spcPts val="800"/>
+                <a:spcPts val="333"/>
               </a:spcAft>
+              <a:buClrTx/>
+              <a:buSzTx/>
+              <a:buFontTx/>
               <a:buNone/>
+              <a:tabLst/>
+              <a:defRPr/>
             </a:pPr>
             <a:r>
-              <a:rPr lang="en-US" sz="1800" kern="100" dirty="0">
-                <a:effectLst/>
-                <a:latin typeface="Aptos" panose="020B0004020202020204" pitchFamily="34" charset="0"/>
-                <a:ea typeface="Aptos" panose="020B0004020202020204" pitchFamily="34" charset="0"/>
-                <a:cs typeface="Times New Roman" panose="02020603050405020304" pitchFamily="18" charset="0"/>
-              </a:rPr>
-              <a:t>To ensure that .NET 10 is the fastest release of ASP.NET Core ever:</a:t>
-            </a:r>
-          </a:p>
-          <a:p>
-            <a:pPr marL="342900" marR="0" lvl="0" indent="-342900">
-              <a:lnSpc>
-                <a:spcPct val="115000"/>
-              </a:lnSpc>
-              <a:buFont typeface="Aptos" panose="020B0004020202020204" pitchFamily="34" charset="0"/>
-              <a:buChar char="-"/>
-            </a:pPr>
-            <a:r>
-              <a:rPr lang="en-US" sz="1800" kern="100" dirty="0">
-                <a:effectLst/>
-                <a:latin typeface="Aptos" panose="020B0004020202020204" pitchFamily="34" charset="0"/>
-                <a:ea typeface="Aptos" panose="020B0004020202020204" pitchFamily="34" charset="0"/>
-                <a:cs typeface="Times New Roman" panose="02020603050405020304" pitchFamily="18" charset="0"/>
-              </a:rPr>
-              <a:t>We’re updating Kestrel’s memory pool so that it can release memory</a:t>
-            </a:r>
-          </a:p>
-          <a:p>
-            <a:pPr marL="342900" marR="0" lvl="0" indent="-342900">
-              <a:lnSpc>
-                <a:spcPct val="115000"/>
-              </a:lnSpc>
-              <a:buFont typeface="Aptos" panose="020B0004020202020204" pitchFamily="34" charset="0"/>
-              <a:buChar char="-"/>
-            </a:pPr>
-            <a:r>
-              <a:rPr lang="en-US" sz="1800" kern="100" dirty="0">
-                <a:effectLst/>
-                <a:latin typeface="Aptos" panose="020B0004020202020204" pitchFamily="34" charset="0"/>
-                <a:ea typeface="Aptos" panose="020B0004020202020204" pitchFamily="34" charset="0"/>
-                <a:cs typeface="Times New Roman" panose="02020603050405020304" pitchFamily="18" charset="0"/>
-              </a:rPr>
-              <a:t>We’re improving minimal API JSON deserialization performance using the new </a:t>
-            </a:r>
-            <a:r>
-              <a:rPr lang="en-US" sz="1800" kern="100" dirty="0" err="1">
-                <a:effectLst/>
-                <a:latin typeface="Aptos" panose="020B0004020202020204" pitchFamily="34" charset="0"/>
-                <a:ea typeface="Aptos" panose="020B0004020202020204" pitchFamily="34" charset="0"/>
-                <a:cs typeface="Times New Roman" panose="02020603050405020304" pitchFamily="18" charset="0"/>
-              </a:rPr>
-              <a:t>PIpeReader</a:t>
-            </a:r>
-            <a:r>
-              <a:rPr lang="en-US" sz="1800" kern="100" dirty="0">
-                <a:effectLst/>
-                <a:latin typeface="Aptos" panose="020B0004020202020204" pitchFamily="34" charset="0"/>
-                <a:ea typeface="Aptos" panose="020B0004020202020204" pitchFamily="34" charset="0"/>
-                <a:cs typeface="Times New Roman" panose="02020603050405020304" pitchFamily="18" charset="0"/>
-              </a:rPr>
-              <a:t> support in </a:t>
-            </a:r>
-            <a:r>
-              <a:rPr lang="en-US" sz="1800" kern="100" dirty="0" err="1">
-                <a:effectLst/>
-                <a:latin typeface="Aptos" panose="020B0004020202020204" pitchFamily="34" charset="0"/>
-                <a:ea typeface="Aptos" panose="020B0004020202020204" pitchFamily="34" charset="0"/>
-                <a:cs typeface="Times New Roman" panose="02020603050405020304" pitchFamily="18" charset="0"/>
-              </a:rPr>
-              <a:t>System.Text.Json</a:t>
-            </a:r>
-            <a:r>
-              <a:rPr lang="en-US" sz="1800" kern="100" dirty="0">
-                <a:effectLst/>
-                <a:latin typeface="Aptos" panose="020B0004020202020204" pitchFamily="34" charset="0"/>
-                <a:ea typeface="Aptos" panose="020B0004020202020204" pitchFamily="34" charset="0"/>
-                <a:cs typeface="Times New Roman" panose="02020603050405020304" pitchFamily="18" charset="0"/>
-              </a:rPr>
-              <a:t>. </a:t>
-            </a:r>
-          </a:p>
-          <a:p>
-            <a:endParaRPr lang="en-US" dirty="0"/>
-          </a:p>
-        </p:txBody>
-      </p:sp>
-      <p:sp>
-        <p:nvSpPr>
-          <p:cNvPr id="4" name="Header Placeholder 3"/>
+              <a:rPr lang="en-US"/>
+              <a:t>Speaker: Mike</a:t>
+            </a:r>
+          </a:p>
+          <a:p>
+            <a:endParaRPr lang="en-US"/>
+          </a:p>
+        </p:txBody>
+      </p:sp>
+      <p:sp>
+        <p:nvSpPr>
+          <p:cNvPr id="4" name="Header Placeholder 3">
+            <a:extLst>
+              <a:ext uri="{FF2B5EF4-FFF2-40B4-BE49-F238E27FC236}">
+                <a16:creationId xmlns:a16="http://schemas.microsoft.com/office/drawing/2014/main" id="{5D333B13-CA98-E818-E895-725C97BC20C6}"/>
+              </a:ext>
+            </a:extLst>
+          </p:cNvPr>
           <p:cNvSpPr>
             <a:spLocks noGrp="1"/>
           </p:cNvSpPr>
@@ -606,7 +557,13 @@
       </p:sp>
       <p:sp>
         <p:nvSpPr>
-          <p:cNvPr id="5" name="Footer Placeholder 4"/>
+          <p:cNvPr id="5" name="Footer Placeholder 4">
+            <a:extLst>
+              <a:ext uri="{FF2B5EF4-FFF2-40B4-BE49-F238E27FC236}">
+                <a16:creationId xmlns:a16="http://schemas.microsoft.com/office/drawing/2014/main" id="{7D0232D6-6FB8-AD71-9AF9-DDBF60592703}"/>
+              </a:ext>
+            </a:extLst>
+          </p:cNvPr>
           <p:cNvSpPr>
             <a:spLocks noGrp="1"/>
           </p:cNvSpPr>
@@ -644,7 +601,13 @@
       </p:sp>
       <p:sp>
         <p:nvSpPr>
-          <p:cNvPr id="6" name="Date Placeholder 5"/>
+          <p:cNvPr id="6" name="Date Placeholder 5">
+            <a:extLst>
+              <a:ext uri="{FF2B5EF4-FFF2-40B4-BE49-F238E27FC236}">
+                <a16:creationId xmlns:a16="http://schemas.microsoft.com/office/drawing/2014/main" id="{4F3C7EB0-847D-1DFF-D664-FF64D003D240}"/>
+              </a:ext>
+            </a:extLst>
+          </p:cNvPr>
           <p:cNvSpPr>
             <a:spLocks noGrp="1"/>
           </p:cNvSpPr>
@@ -659,7 +622,7 @@
           <a:p>
             <a:fld id="{2D91FF38-03BF-E345-8DFA-92A7B1D66F0D}" type="datetime8">
               <a:rPr lang="en-US" smtClean="0"/>
-              <a:t>2/10/2026 5:30 PM</a:t>
+              <a:t>2/12/2026 10:09 AM</a:t>
             </a:fld>
             <a:endParaRPr lang="en-US"/>
           </a:p>
@@ -667,7 +630,13 @@
       </p:sp>
       <p:sp>
         <p:nvSpPr>
-          <p:cNvPr id="7" name="Slide Number Placeholder 6"/>
+          <p:cNvPr id="7" name="Slide Number Placeholder 6">
+            <a:extLst>
+              <a:ext uri="{FF2B5EF4-FFF2-40B4-BE49-F238E27FC236}">
+                <a16:creationId xmlns:a16="http://schemas.microsoft.com/office/drawing/2014/main" id="{937CC67A-D73D-4DCC-1346-8A78719F7A62}"/>
+              </a:ext>
+            </a:extLst>
+          </p:cNvPr>
           <p:cNvSpPr>
             <a:spLocks noGrp="1"/>
           </p:cNvSpPr>
@@ -692,7 +661,7 @@
     </p:spTree>
     <p:extLst>
       <p:ext uri="{BB962C8B-B14F-4D97-AF65-F5344CB8AC3E}">
-        <p14:creationId xmlns:p14="http://schemas.microsoft.com/office/powerpoint/2010/main" val="1765686537"/>
+        <p14:creationId xmlns:p14="http://schemas.microsoft.com/office/powerpoint/2010/main" val="2787860676"/>
       </p:ext>
     </p:extLst>
   </p:cSld>
@@ -703,604 +672,6 @@
 </file>
 
 <file path=ppt/notesSlides/notesSlide3.xml><?xml version="1.0" encoding="utf-8"?>
-<p:notes xmlns:a="http://schemas.openxmlformats.org/drawingml/2006/main" xmlns:r="http://schemas.openxmlformats.org/officeDocument/2006/relationships" xmlns:p="http://schemas.openxmlformats.org/presentationml/2006/main">
-  <p:cSld>
-    <p:spTree>
-      <p:nvGrpSpPr>
-        <p:cNvPr id="1" name="">
-          <a:extLst>
-            <a:ext uri="{FF2B5EF4-FFF2-40B4-BE49-F238E27FC236}">
-              <a16:creationId xmlns:a16="http://schemas.microsoft.com/office/drawing/2014/main" id="{2B98A075-D437-ADB7-CB6C-E9C757F51613}"/>
-            </a:ext>
-          </a:extLst>
-        </p:cNvPr>
-        <p:cNvGrpSpPr/>
-        <p:nvPr/>
-      </p:nvGrpSpPr>
-      <p:grpSpPr>
-        <a:xfrm>
-          <a:off x="0" y="0"/>
-          <a:ext cx="0" cy="0"/>
-          <a:chOff x="0" y="0"/>
-          <a:chExt cx="0" cy="0"/>
-        </a:xfrm>
-      </p:grpSpPr>
-      <p:sp>
-        <p:nvSpPr>
-          <p:cNvPr id="2" name="Slide Image Placeholder 1">
-            <a:extLst>
-              <a:ext uri="{FF2B5EF4-FFF2-40B4-BE49-F238E27FC236}">
-                <a16:creationId xmlns:a16="http://schemas.microsoft.com/office/drawing/2014/main" id="{7C707D38-F3A2-03E2-F10C-A3E716C76FF9}"/>
-              </a:ext>
-            </a:extLst>
-          </p:cNvPr>
-          <p:cNvSpPr>
-            <a:spLocks noGrp="1" noRot="1" noChangeAspect="1"/>
-          </p:cNvSpPr>
-          <p:nvPr>
-            <p:ph type="sldImg"/>
-          </p:nvPr>
-        </p:nvSpPr>
-        <p:spPr/>
-      </p:sp>
-      <p:sp>
-        <p:nvSpPr>
-          <p:cNvPr id="3" name="Notes Placeholder 2">
-            <a:extLst>
-              <a:ext uri="{FF2B5EF4-FFF2-40B4-BE49-F238E27FC236}">
-                <a16:creationId xmlns:a16="http://schemas.microsoft.com/office/drawing/2014/main" id="{FB9A58C9-94CB-0CED-376B-E14B24E060A7}"/>
-              </a:ext>
-            </a:extLst>
-          </p:cNvPr>
-          <p:cNvSpPr>
-            <a:spLocks noGrp="1"/>
-          </p:cNvSpPr>
-          <p:nvPr>
-            <p:ph type="body" idx="1"/>
-          </p:nvPr>
-        </p:nvSpPr>
-        <p:spPr/>
-        <p:txBody>
-          <a:bodyPr/>
-          <a:lstStyle/>
-          <a:p>
-            <a:pPr marL="0" marR="0">
-              <a:lnSpc>
-                <a:spcPct val="115000"/>
-              </a:lnSpc>
-              <a:spcAft>
-                <a:spcPts val="800"/>
-              </a:spcAft>
-              <a:buNone/>
-            </a:pPr>
-            <a:r>
-              <a:rPr lang="en-US" sz="1800" kern="100" dirty="0">
-                <a:effectLst/>
-                <a:latin typeface="Aptos" panose="020B0004020202020204" pitchFamily="34" charset="0"/>
-                <a:ea typeface="Aptos" panose="020B0004020202020204" pitchFamily="34" charset="0"/>
-                <a:cs typeface="Times New Roman" panose="02020603050405020304" pitchFamily="18" charset="0"/>
-              </a:rPr>
-              <a:t>To ensure that .NET 10 is the fastest release of ASP.NET Core ever:</a:t>
-            </a:r>
-          </a:p>
-          <a:p>
-            <a:pPr marL="342900" marR="0" lvl="0" indent="-342900">
-              <a:lnSpc>
-                <a:spcPct val="115000"/>
-              </a:lnSpc>
-              <a:buFont typeface="Aptos" panose="020B0004020202020204" pitchFamily="34" charset="0"/>
-              <a:buChar char="-"/>
-            </a:pPr>
-            <a:r>
-              <a:rPr lang="en-US" sz="1800" kern="100" dirty="0">
-                <a:effectLst/>
-                <a:latin typeface="Aptos" panose="020B0004020202020204" pitchFamily="34" charset="0"/>
-                <a:ea typeface="Aptos" panose="020B0004020202020204" pitchFamily="34" charset="0"/>
-                <a:cs typeface="Times New Roman" panose="02020603050405020304" pitchFamily="18" charset="0"/>
-              </a:rPr>
-              <a:t>We’re updating Kestrel’s memory pool so that it can release memory</a:t>
-            </a:r>
-          </a:p>
-          <a:p>
-            <a:pPr marL="342900" marR="0" lvl="0" indent="-342900">
-              <a:lnSpc>
-                <a:spcPct val="115000"/>
-              </a:lnSpc>
-              <a:buFont typeface="Aptos" panose="020B0004020202020204" pitchFamily="34" charset="0"/>
-              <a:buChar char="-"/>
-            </a:pPr>
-            <a:r>
-              <a:rPr lang="en-US" sz="1800" kern="100" dirty="0">
-                <a:effectLst/>
-                <a:latin typeface="Aptos" panose="020B0004020202020204" pitchFamily="34" charset="0"/>
-                <a:ea typeface="Aptos" panose="020B0004020202020204" pitchFamily="34" charset="0"/>
-                <a:cs typeface="Times New Roman" panose="02020603050405020304" pitchFamily="18" charset="0"/>
-              </a:rPr>
-              <a:t>We’re improving minimal API JSON deserialization performance using the new </a:t>
-            </a:r>
-            <a:r>
-              <a:rPr lang="en-US" sz="1800" kern="100" dirty="0" err="1">
-                <a:effectLst/>
-                <a:latin typeface="Aptos" panose="020B0004020202020204" pitchFamily="34" charset="0"/>
-                <a:ea typeface="Aptos" panose="020B0004020202020204" pitchFamily="34" charset="0"/>
-                <a:cs typeface="Times New Roman" panose="02020603050405020304" pitchFamily="18" charset="0"/>
-              </a:rPr>
-              <a:t>PIpeReader</a:t>
-            </a:r>
-            <a:r>
-              <a:rPr lang="en-US" sz="1800" kern="100" dirty="0">
-                <a:effectLst/>
-                <a:latin typeface="Aptos" panose="020B0004020202020204" pitchFamily="34" charset="0"/>
-                <a:ea typeface="Aptos" panose="020B0004020202020204" pitchFamily="34" charset="0"/>
-                <a:cs typeface="Times New Roman" panose="02020603050405020304" pitchFamily="18" charset="0"/>
-              </a:rPr>
-              <a:t> support in </a:t>
-            </a:r>
-            <a:r>
-              <a:rPr lang="en-US" sz="1800" kern="100" dirty="0" err="1">
-                <a:effectLst/>
-                <a:latin typeface="Aptos" panose="020B0004020202020204" pitchFamily="34" charset="0"/>
-                <a:ea typeface="Aptos" panose="020B0004020202020204" pitchFamily="34" charset="0"/>
-                <a:cs typeface="Times New Roman" panose="02020603050405020304" pitchFamily="18" charset="0"/>
-              </a:rPr>
-              <a:t>System.Text.Json</a:t>
-            </a:r>
-            <a:r>
-              <a:rPr lang="en-US" sz="1800" kern="100" dirty="0">
-                <a:effectLst/>
-                <a:latin typeface="Aptos" panose="020B0004020202020204" pitchFamily="34" charset="0"/>
-                <a:ea typeface="Aptos" panose="020B0004020202020204" pitchFamily="34" charset="0"/>
-                <a:cs typeface="Times New Roman" panose="02020603050405020304" pitchFamily="18" charset="0"/>
-              </a:rPr>
-              <a:t>. </a:t>
-            </a:r>
-          </a:p>
-          <a:p>
-            <a:endParaRPr lang="en-US" dirty="0"/>
-          </a:p>
-        </p:txBody>
-      </p:sp>
-      <p:sp>
-        <p:nvSpPr>
-          <p:cNvPr id="4" name="Header Placeholder 3">
-            <a:extLst>
-              <a:ext uri="{FF2B5EF4-FFF2-40B4-BE49-F238E27FC236}">
-                <a16:creationId xmlns:a16="http://schemas.microsoft.com/office/drawing/2014/main" id="{0AE2A959-3DED-5931-08B0-FBEDB1FFBDDA}"/>
-              </a:ext>
-            </a:extLst>
-          </p:cNvPr>
-          <p:cNvSpPr>
-            <a:spLocks noGrp="1"/>
-          </p:cNvSpPr>
-          <p:nvPr>
-            <p:ph type="hdr" sz="quarter"/>
-          </p:nvPr>
-        </p:nvSpPr>
-        <p:spPr/>
-        <p:txBody>
-          <a:bodyPr/>
-          <a:lstStyle/>
-          <a:p>
-            <a:endParaRPr lang="en-US"/>
-          </a:p>
-        </p:txBody>
-      </p:sp>
-      <p:sp>
-        <p:nvSpPr>
-          <p:cNvPr id="5" name="Footer Placeholder 4">
-            <a:extLst>
-              <a:ext uri="{FF2B5EF4-FFF2-40B4-BE49-F238E27FC236}">
-                <a16:creationId xmlns:a16="http://schemas.microsoft.com/office/drawing/2014/main" id="{5ED6A5F0-5108-ABD1-26BD-A98FBB52F765}"/>
-              </a:ext>
-            </a:extLst>
-          </p:cNvPr>
-          <p:cNvSpPr>
-            <a:spLocks noGrp="1"/>
-          </p:cNvSpPr>
-          <p:nvPr>
-            <p:ph type="ftr" sz="quarter" idx="4"/>
-          </p:nvPr>
-        </p:nvSpPr>
-        <p:spPr/>
-        <p:txBody>
-          <a:bodyPr/>
-          <a:lstStyle/>
-          <a:p>
-            <a:pPr defTabSz="914099" eaLnBrk="0" hangingPunct="0"/>
-            <a:r>
-              <a:rPr lang="en-US" sz="400">
-                <a:gradFill>
-                  <a:gsLst>
-                    <a:gs pos="0">
-                      <a:prstClr val="black"/>
-                    </a:gs>
-                    <a:gs pos="100000">
-                      <a:prstClr val="black"/>
-                    </a:gs>
-                  </a:gsLst>
-                  <a:lin ang="5400000" scaled="0"/>
-                </a:gradFill>
-                <a:latin typeface="Segoe UI" pitchFamily="34" charset="0"/>
-                <a:ea typeface="Segoe UI" pitchFamily="34" charset="0"/>
-                <a:cs typeface="Segoe UI" pitchFamily="34" charset="0"/>
-              </a:rPr>
-              <a:t>© Microsoft Corporation. All rights reserved. MICROSOFT MAKES NO WARRANTIES, EXPRESS, IMPLIED OR STATUTORY, AS TO THE INFORMATION IN THIS PRESENTATION.</a:t>
-            </a:r>
-          </a:p>
-        </p:txBody>
-      </p:sp>
-      <p:sp>
-        <p:nvSpPr>
-          <p:cNvPr id="6" name="Date Placeholder 5">
-            <a:extLst>
-              <a:ext uri="{FF2B5EF4-FFF2-40B4-BE49-F238E27FC236}">
-                <a16:creationId xmlns:a16="http://schemas.microsoft.com/office/drawing/2014/main" id="{EFED70E0-7955-EAD9-0D10-B8C4F6EB2C36}"/>
-              </a:ext>
-            </a:extLst>
-          </p:cNvPr>
-          <p:cNvSpPr>
-            <a:spLocks noGrp="1"/>
-          </p:cNvSpPr>
-          <p:nvPr>
-            <p:ph type="dt" idx="1"/>
-          </p:nvPr>
-        </p:nvSpPr>
-        <p:spPr/>
-        <p:txBody>
-          <a:bodyPr/>
-          <a:lstStyle/>
-          <a:p>
-            <a:fld id="{2D91FF38-03BF-E345-8DFA-92A7B1D66F0D}" type="datetime8">
-              <a:rPr lang="en-US" smtClean="0"/>
-              <a:t>2/10/2026 5:30 PM</a:t>
-            </a:fld>
-            <a:endParaRPr lang="en-US"/>
-          </a:p>
-        </p:txBody>
-      </p:sp>
-      <p:sp>
-        <p:nvSpPr>
-          <p:cNvPr id="7" name="Slide Number Placeholder 6">
-            <a:extLst>
-              <a:ext uri="{FF2B5EF4-FFF2-40B4-BE49-F238E27FC236}">
-                <a16:creationId xmlns:a16="http://schemas.microsoft.com/office/drawing/2014/main" id="{D2CA170D-9225-83FB-E0E9-07C639D80353}"/>
-              </a:ext>
-            </a:extLst>
-          </p:cNvPr>
-          <p:cNvSpPr>
-            <a:spLocks noGrp="1"/>
-          </p:cNvSpPr>
-          <p:nvPr>
-            <p:ph type="sldNum" sz="quarter" idx="5"/>
-          </p:nvPr>
-        </p:nvSpPr>
-        <p:spPr/>
-        <p:txBody>
-          <a:bodyPr/>
-          <a:lstStyle/>
-          <a:p>
-            <a:fld id="{B4008EB6-D09E-4580-8CD6-DDB14511944F}" type="slidenum">
-              <a:rPr lang="en-US" smtClean="0"/>
-              <a:pPr/>
-              <a:t>7</a:t>
-            </a:fld>
-            <a:endParaRPr lang="en-US"/>
-          </a:p>
-        </p:txBody>
-      </p:sp>
-    </p:spTree>
-    <p:extLst>
-      <p:ext uri="{BB962C8B-B14F-4D97-AF65-F5344CB8AC3E}">
-        <p14:creationId xmlns:p14="http://schemas.microsoft.com/office/powerpoint/2010/main" val="3671183739"/>
-      </p:ext>
-    </p:extLst>
-  </p:cSld>
-  <p:clrMapOvr>
-    <a:masterClrMapping/>
-  </p:clrMapOvr>
-</p:notes>
-</file>
-
-<file path=ppt/notesSlides/notesSlide4.xml><?xml version="1.0" encoding="utf-8"?>
-<p:notes xmlns:a="http://schemas.openxmlformats.org/drawingml/2006/main" xmlns:r="http://schemas.openxmlformats.org/officeDocument/2006/relationships" xmlns:p="http://schemas.openxmlformats.org/presentationml/2006/main">
-  <p:cSld>
-    <p:spTree>
-      <p:nvGrpSpPr>
-        <p:cNvPr id="1" name="">
-          <a:extLst>
-            <a:ext uri="{FF2B5EF4-FFF2-40B4-BE49-F238E27FC236}">
-              <a16:creationId xmlns:a16="http://schemas.microsoft.com/office/drawing/2014/main" id="{E07F055B-EBF5-A17E-F0A2-2EC822758E58}"/>
-            </a:ext>
-          </a:extLst>
-        </p:cNvPr>
-        <p:cNvGrpSpPr/>
-        <p:nvPr/>
-      </p:nvGrpSpPr>
-      <p:grpSpPr>
-        <a:xfrm>
-          <a:off x="0" y="0"/>
-          <a:ext cx="0" cy="0"/>
-          <a:chOff x="0" y="0"/>
-          <a:chExt cx="0" cy="0"/>
-        </a:xfrm>
-      </p:grpSpPr>
-      <p:sp>
-        <p:nvSpPr>
-          <p:cNvPr id="2" name="Slide Image Placeholder 1">
-            <a:extLst>
-              <a:ext uri="{FF2B5EF4-FFF2-40B4-BE49-F238E27FC236}">
-                <a16:creationId xmlns:a16="http://schemas.microsoft.com/office/drawing/2014/main" id="{E0B1D74F-CA5E-E4C1-5BDB-D2BE440C339C}"/>
-              </a:ext>
-            </a:extLst>
-          </p:cNvPr>
-          <p:cNvSpPr>
-            <a:spLocks noGrp="1" noRot="1" noChangeAspect="1"/>
-          </p:cNvSpPr>
-          <p:nvPr>
-            <p:ph type="sldImg"/>
-          </p:nvPr>
-        </p:nvSpPr>
-        <p:spPr/>
-      </p:sp>
-      <p:sp>
-        <p:nvSpPr>
-          <p:cNvPr id="3" name="Notes Placeholder 2">
-            <a:extLst>
-              <a:ext uri="{FF2B5EF4-FFF2-40B4-BE49-F238E27FC236}">
-                <a16:creationId xmlns:a16="http://schemas.microsoft.com/office/drawing/2014/main" id="{80DB1DF3-B5E5-5702-9BC2-2E7D7240C832}"/>
-              </a:ext>
-            </a:extLst>
-          </p:cNvPr>
-          <p:cNvSpPr>
-            <a:spLocks noGrp="1"/>
-          </p:cNvSpPr>
-          <p:nvPr>
-            <p:ph type="body" idx="1"/>
-          </p:nvPr>
-        </p:nvSpPr>
-        <p:spPr/>
-        <p:txBody>
-          <a:bodyPr/>
-          <a:lstStyle/>
-          <a:p>
-            <a:pPr marL="0" marR="0">
-              <a:lnSpc>
-                <a:spcPct val="115000"/>
-              </a:lnSpc>
-              <a:spcAft>
-                <a:spcPts val="800"/>
-              </a:spcAft>
-              <a:buNone/>
-            </a:pPr>
-            <a:r>
-              <a:rPr lang="en-US" sz="1800" kern="100" dirty="0">
-                <a:effectLst/>
-                <a:latin typeface="Aptos" panose="020B0004020202020204" pitchFamily="34" charset="0"/>
-                <a:ea typeface="Aptos" panose="020B0004020202020204" pitchFamily="34" charset="0"/>
-                <a:cs typeface="Times New Roman" panose="02020603050405020304" pitchFamily="18" charset="0"/>
-              </a:rPr>
-              <a:t>To ensure that .NET 10 is the fastest release of ASP.NET Core ever:</a:t>
-            </a:r>
-          </a:p>
-          <a:p>
-            <a:pPr marL="342900" marR="0" lvl="0" indent="-342900">
-              <a:lnSpc>
-                <a:spcPct val="115000"/>
-              </a:lnSpc>
-              <a:buFont typeface="Aptos" panose="020B0004020202020204" pitchFamily="34" charset="0"/>
-              <a:buChar char="-"/>
-            </a:pPr>
-            <a:r>
-              <a:rPr lang="en-US" sz="1800" kern="100" dirty="0">
-                <a:effectLst/>
-                <a:latin typeface="Aptos" panose="020B0004020202020204" pitchFamily="34" charset="0"/>
-                <a:ea typeface="Aptos" panose="020B0004020202020204" pitchFamily="34" charset="0"/>
-                <a:cs typeface="Times New Roman" panose="02020603050405020304" pitchFamily="18" charset="0"/>
-              </a:rPr>
-              <a:t>We’re updating Kestrel’s memory pool so that it can release memory</a:t>
-            </a:r>
-          </a:p>
-          <a:p>
-            <a:pPr marL="342900" marR="0" lvl="0" indent="-342900">
-              <a:lnSpc>
-                <a:spcPct val="115000"/>
-              </a:lnSpc>
-              <a:buFont typeface="Aptos" panose="020B0004020202020204" pitchFamily="34" charset="0"/>
-              <a:buChar char="-"/>
-            </a:pPr>
-            <a:r>
-              <a:rPr lang="en-US" sz="1800" kern="100" dirty="0">
-                <a:effectLst/>
-                <a:latin typeface="Aptos" panose="020B0004020202020204" pitchFamily="34" charset="0"/>
-                <a:ea typeface="Aptos" panose="020B0004020202020204" pitchFamily="34" charset="0"/>
-                <a:cs typeface="Times New Roman" panose="02020603050405020304" pitchFamily="18" charset="0"/>
-              </a:rPr>
-              <a:t>We’re improving minimal API JSON deserialization performance using the new </a:t>
-            </a:r>
-            <a:r>
-              <a:rPr lang="en-US" sz="1800" kern="100" dirty="0" err="1">
-                <a:effectLst/>
-                <a:latin typeface="Aptos" panose="020B0004020202020204" pitchFamily="34" charset="0"/>
-                <a:ea typeface="Aptos" panose="020B0004020202020204" pitchFamily="34" charset="0"/>
-                <a:cs typeface="Times New Roman" panose="02020603050405020304" pitchFamily="18" charset="0"/>
-              </a:rPr>
-              <a:t>PIpeReader</a:t>
-            </a:r>
-            <a:r>
-              <a:rPr lang="en-US" sz="1800" kern="100" dirty="0">
-                <a:effectLst/>
-                <a:latin typeface="Aptos" panose="020B0004020202020204" pitchFamily="34" charset="0"/>
-                <a:ea typeface="Aptos" panose="020B0004020202020204" pitchFamily="34" charset="0"/>
-                <a:cs typeface="Times New Roman" panose="02020603050405020304" pitchFamily="18" charset="0"/>
-              </a:rPr>
-              <a:t> support in </a:t>
-            </a:r>
-            <a:r>
-              <a:rPr lang="en-US" sz="1800" kern="100" dirty="0" err="1">
-                <a:effectLst/>
-                <a:latin typeface="Aptos" panose="020B0004020202020204" pitchFamily="34" charset="0"/>
-                <a:ea typeface="Aptos" panose="020B0004020202020204" pitchFamily="34" charset="0"/>
-                <a:cs typeface="Times New Roman" panose="02020603050405020304" pitchFamily="18" charset="0"/>
-              </a:rPr>
-              <a:t>System.Text.Json</a:t>
-            </a:r>
-            <a:r>
-              <a:rPr lang="en-US" sz="1800" kern="100" dirty="0">
-                <a:effectLst/>
-                <a:latin typeface="Aptos" panose="020B0004020202020204" pitchFamily="34" charset="0"/>
-                <a:ea typeface="Aptos" panose="020B0004020202020204" pitchFamily="34" charset="0"/>
-                <a:cs typeface="Times New Roman" panose="02020603050405020304" pitchFamily="18" charset="0"/>
-              </a:rPr>
-              <a:t>. </a:t>
-            </a:r>
-          </a:p>
-          <a:p>
-            <a:endParaRPr lang="en-US" dirty="0"/>
-          </a:p>
-        </p:txBody>
-      </p:sp>
-      <p:sp>
-        <p:nvSpPr>
-          <p:cNvPr id="4" name="Header Placeholder 3">
-            <a:extLst>
-              <a:ext uri="{FF2B5EF4-FFF2-40B4-BE49-F238E27FC236}">
-                <a16:creationId xmlns:a16="http://schemas.microsoft.com/office/drawing/2014/main" id="{84130DD4-37A1-289B-33A7-EF32349EA774}"/>
-              </a:ext>
-            </a:extLst>
-          </p:cNvPr>
-          <p:cNvSpPr>
-            <a:spLocks noGrp="1"/>
-          </p:cNvSpPr>
-          <p:nvPr>
-            <p:ph type="hdr" sz="quarter"/>
-          </p:nvPr>
-        </p:nvSpPr>
-        <p:spPr/>
-        <p:txBody>
-          <a:bodyPr/>
-          <a:lstStyle/>
-          <a:p>
-            <a:endParaRPr lang="en-US"/>
-          </a:p>
-        </p:txBody>
-      </p:sp>
-      <p:sp>
-        <p:nvSpPr>
-          <p:cNvPr id="5" name="Footer Placeholder 4">
-            <a:extLst>
-              <a:ext uri="{FF2B5EF4-FFF2-40B4-BE49-F238E27FC236}">
-                <a16:creationId xmlns:a16="http://schemas.microsoft.com/office/drawing/2014/main" id="{7F3EB900-DD0A-2219-92EB-586E7AE14E1C}"/>
-              </a:ext>
-            </a:extLst>
-          </p:cNvPr>
-          <p:cNvSpPr>
-            <a:spLocks noGrp="1"/>
-          </p:cNvSpPr>
-          <p:nvPr>
-            <p:ph type="ftr" sz="quarter" idx="4"/>
-          </p:nvPr>
-        </p:nvSpPr>
-        <p:spPr/>
-        <p:txBody>
-          <a:bodyPr/>
-          <a:lstStyle/>
-          <a:p>
-            <a:pPr defTabSz="914099" eaLnBrk="0" hangingPunct="0"/>
-            <a:r>
-              <a:rPr lang="en-US" sz="400">
-                <a:gradFill>
-                  <a:gsLst>
-                    <a:gs pos="0">
-                      <a:prstClr val="black"/>
-                    </a:gs>
-                    <a:gs pos="100000">
-                      <a:prstClr val="black"/>
-                    </a:gs>
-                  </a:gsLst>
-                  <a:lin ang="5400000" scaled="0"/>
-                </a:gradFill>
-                <a:latin typeface="Segoe UI" pitchFamily="34" charset="0"/>
-                <a:ea typeface="Segoe UI" pitchFamily="34" charset="0"/>
-                <a:cs typeface="Segoe UI" pitchFamily="34" charset="0"/>
-              </a:rPr>
-              <a:t>© Microsoft Corporation. All rights reserved. MICROSOFT MAKES NO WARRANTIES, EXPRESS, IMPLIED OR STATUTORY, AS TO THE INFORMATION IN THIS PRESENTATION.</a:t>
-            </a:r>
-          </a:p>
-        </p:txBody>
-      </p:sp>
-      <p:sp>
-        <p:nvSpPr>
-          <p:cNvPr id="6" name="Date Placeholder 5">
-            <a:extLst>
-              <a:ext uri="{FF2B5EF4-FFF2-40B4-BE49-F238E27FC236}">
-                <a16:creationId xmlns:a16="http://schemas.microsoft.com/office/drawing/2014/main" id="{37942D0E-006B-8AE6-E89C-C08F204D6969}"/>
-              </a:ext>
-            </a:extLst>
-          </p:cNvPr>
-          <p:cNvSpPr>
-            <a:spLocks noGrp="1"/>
-          </p:cNvSpPr>
-          <p:nvPr>
-            <p:ph type="dt" idx="1"/>
-          </p:nvPr>
-        </p:nvSpPr>
-        <p:spPr/>
-        <p:txBody>
-          <a:bodyPr/>
-          <a:lstStyle/>
-          <a:p>
-            <a:fld id="{2D91FF38-03BF-E345-8DFA-92A7B1D66F0D}" type="datetime8">
-              <a:rPr lang="en-US" smtClean="0"/>
-              <a:t>2/10/2026 5:30 PM</a:t>
-            </a:fld>
-            <a:endParaRPr lang="en-US"/>
-          </a:p>
-        </p:txBody>
-      </p:sp>
-      <p:sp>
-        <p:nvSpPr>
-          <p:cNvPr id="7" name="Slide Number Placeholder 6">
-            <a:extLst>
-              <a:ext uri="{FF2B5EF4-FFF2-40B4-BE49-F238E27FC236}">
-                <a16:creationId xmlns:a16="http://schemas.microsoft.com/office/drawing/2014/main" id="{1DEAA36F-8CE0-20F2-BE32-2A35643DA633}"/>
-              </a:ext>
-            </a:extLst>
-          </p:cNvPr>
-          <p:cNvSpPr>
-            <a:spLocks noGrp="1"/>
-          </p:cNvSpPr>
-          <p:nvPr>
-            <p:ph type="sldNum" sz="quarter" idx="5"/>
-          </p:nvPr>
-        </p:nvSpPr>
-        <p:spPr/>
-        <p:txBody>
-          <a:bodyPr/>
-          <a:lstStyle/>
-          <a:p>
-            <a:fld id="{B4008EB6-D09E-4580-8CD6-DDB14511944F}" type="slidenum">
-              <a:rPr lang="en-US" smtClean="0"/>
-              <a:pPr/>
-              <a:t>9</a:t>
-            </a:fld>
-            <a:endParaRPr lang="en-US"/>
-          </a:p>
-        </p:txBody>
-      </p:sp>
-    </p:spTree>
-    <p:extLst>
-      <p:ext uri="{BB962C8B-B14F-4D97-AF65-F5344CB8AC3E}">
-        <p14:creationId xmlns:p14="http://schemas.microsoft.com/office/powerpoint/2010/main" val="4171042412"/>
-      </p:ext>
-    </p:extLst>
-  </p:cSld>
-  <p:clrMapOvr>
-    <a:masterClrMapping/>
-  </p:clrMapOvr>
-</p:notes>
-</file>
-
-<file path=ppt/notesSlides/notesSlide5.xml><?xml version="1.0" encoding="utf-8"?>
 <p:notes xmlns:a="http://schemas.openxmlformats.org/drawingml/2006/main" xmlns:r="http://schemas.openxmlformats.org/officeDocument/2006/relationships" xmlns:p="http://schemas.openxmlformats.org/presentationml/2006/main">
   <p:cSld>
     <p:spTree>
@@ -1386,7 +757,7 @@
 </p:notes>
 </file>
 
-<file path=ppt/notesSlides/notesSlide6.xml><?xml version="1.0" encoding="utf-8"?>
+<file path=ppt/notesSlides/notesSlide4.xml><?xml version="1.0" encoding="utf-8"?>
 <p:notes xmlns:a="http://schemas.openxmlformats.org/drawingml/2006/main" xmlns:r="http://schemas.openxmlformats.org/officeDocument/2006/relationships" xmlns:p="http://schemas.openxmlformats.org/presentationml/2006/main">
   <p:cSld>
     <p:spTree>
@@ -1737,6 +1108,36 @@
 </p:sldLayout>
 </file>
 
+<file path=ppt/slideLayouts/slideLayout10.xml><?xml version="1.0" encoding="utf-8"?>
+<p:sldLayout xmlns:a="http://schemas.openxmlformats.org/drawingml/2006/main" xmlns:r="http://schemas.openxmlformats.org/officeDocument/2006/relationships" xmlns:p="http://schemas.openxmlformats.org/presentationml/2006/main" type="blank" preserve="1">
+  <p:cSld name="Blank">
+    <p:spTree>
+      <p:nvGrpSpPr>
+        <p:cNvPr id="1" name=""/>
+        <p:cNvGrpSpPr/>
+        <p:nvPr/>
+      </p:nvGrpSpPr>
+      <p:grpSpPr>
+        <a:xfrm>
+          <a:off x="0" y="0"/>
+          <a:ext cx="0" cy="0"/>
+          <a:chOff x="0" y="0"/>
+          <a:chExt cx="0" cy="0"/>
+        </a:xfrm>
+      </p:grpSpPr>
+    </p:spTree>
+    <p:extLst>
+      <p:ext uri="{BB962C8B-B14F-4D97-AF65-F5344CB8AC3E}">
+        <p14:creationId xmlns:p14="http://schemas.microsoft.com/office/powerpoint/2010/main" val="1244902796"/>
+      </p:ext>
+    </p:extLst>
+  </p:cSld>
+  <p:clrMapOvr>
+    <a:masterClrMapping/>
+  </p:clrMapOvr>
+</p:sldLayout>
+</file>
+
 <file path=ppt/slideLayouts/slideLayout2.xml><?xml version="1.0" encoding="utf-8"?>
 <p:sldLayout xmlns:a="http://schemas.openxmlformats.org/drawingml/2006/main" xmlns:r="http://schemas.openxmlformats.org/officeDocument/2006/relationships" xmlns:p="http://schemas.openxmlformats.org/presentationml/2006/main" preserve="1" userDrawn="1">
   <p:cSld name="Title/subtitle only">
@@ -2554,6 +1955,114 @@
 </file>
 
 <file path=ppt/slideLayouts/slideLayout6.xml><?xml version="1.0" encoding="utf-8"?>
+<p:sldLayout xmlns:a="http://schemas.openxmlformats.org/drawingml/2006/main" xmlns:r="http://schemas.openxmlformats.org/officeDocument/2006/relationships" xmlns:p="http://schemas.openxmlformats.org/presentationml/2006/main" type="obj">
+  <p:cSld name="Title and Content">
+    <p:spTree>
+      <p:nvGrpSpPr>
+        <p:cNvPr id="1" name=""/>
+        <p:cNvGrpSpPr/>
+        <p:nvPr/>
+      </p:nvGrpSpPr>
+      <p:grpSpPr>
+        <a:xfrm>
+          <a:off x="0" y="0"/>
+          <a:ext cx="0" cy="0"/>
+          <a:chOff x="0" y="0"/>
+          <a:chExt cx="0" cy="0"/>
+        </a:xfrm>
+      </p:grpSpPr>
+      <p:sp>
+        <p:nvSpPr>
+          <p:cNvPr id="2" name="Title 1"/>
+          <p:cNvSpPr>
+            <a:spLocks noGrp="1"/>
+          </p:cNvSpPr>
+          <p:nvPr>
+            <p:ph type="title"/>
+          </p:nvPr>
+        </p:nvSpPr>
+        <p:spPr/>
+        <p:txBody>
+          <a:bodyPr/>
+          <a:lstStyle/>
+          <a:p>
+            <a:r>
+              <a:rPr lang="en-US"/>
+              <a:t>Click to edit Master title style</a:t>
+            </a:r>
+          </a:p>
+        </p:txBody>
+      </p:sp>
+      <p:sp>
+        <p:nvSpPr>
+          <p:cNvPr id="3" name="Content Placeholder 2"/>
+          <p:cNvSpPr>
+            <a:spLocks noGrp="1"/>
+          </p:cNvSpPr>
+          <p:nvPr>
+            <p:ph idx="1"/>
+          </p:nvPr>
+        </p:nvSpPr>
+        <p:spPr>
+          <a:xfrm>
+            <a:off x="1676619" y="2882347"/>
+            <a:ext cx="21033938" cy="10103402"/>
+          </a:xfrm>
+        </p:spPr>
+        <p:txBody>
+          <a:bodyPr/>
+          <a:lstStyle/>
+          <a:p>
+            <a:pPr lvl="0"/>
+            <a:r>
+              <a:rPr lang="en-US"/>
+              <a:t>Click to edit Master text styles</a:t>
+            </a:r>
+          </a:p>
+          <a:p>
+            <a:pPr lvl="1"/>
+            <a:r>
+              <a:rPr lang="en-US"/>
+              <a:t>Second level</a:t>
+            </a:r>
+          </a:p>
+          <a:p>
+            <a:pPr lvl="2"/>
+            <a:r>
+              <a:rPr lang="en-US"/>
+              <a:t>Third level</a:t>
+            </a:r>
+          </a:p>
+          <a:p>
+            <a:pPr lvl="3"/>
+            <a:r>
+              <a:rPr lang="en-US"/>
+              <a:t>Fourth level</a:t>
+            </a:r>
+          </a:p>
+          <a:p>
+            <a:pPr lvl="4"/>
+            <a:r>
+              <a:rPr lang="en-US"/>
+              <a:t>Fifth level</a:t>
+            </a:r>
+          </a:p>
+        </p:txBody>
+      </p:sp>
+    </p:spTree>
+    <p:extLst>
+      <p:ext uri="{BB962C8B-B14F-4D97-AF65-F5344CB8AC3E}">
+        <p14:creationId xmlns:p14="http://schemas.microsoft.com/office/powerpoint/2010/main" val="3853207633"/>
+      </p:ext>
+    </p:extLst>
+  </p:cSld>
+  <p:clrMapOvr>
+    <a:masterClrMapping/>
+  </p:clrMapOvr>
+</p:sldLayout>
+</file>
+
+<file path=ppt/slideLayouts/slideLayout7.xml><?xml version="1.0" encoding="utf-8"?>
 <p:sldLayout xmlns:a="http://schemas.openxmlformats.org/drawingml/2006/main" xmlns:r="http://schemas.openxmlformats.org/officeDocument/2006/relationships" xmlns:p="http://schemas.openxmlformats.org/presentationml/2006/main" type="obj" preserve="1">
   <p:cSld name="Title and Content">
     <p:spTree>
@@ -2661,7 +2170,7 @@
 </p:sldLayout>
 </file>
 
-<file path=ppt/slideLayouts/slideLayout7.xml><?xml version="1.0" encoding="utf-8"?>
+<file path=ppt/slideLayouts/slideLayout8.xml><?xml version="1.0" encoding="utf-8"?>
 <p:sldLayout xmlns:a="http://schemas.openxmlformats.org/drawingml/2006/main" xmlns:r="http://schemas.openxmlformats.org/officeDocument/2006/relationships" xmlns:p="http://schemas.openxmlformats.org/presentationml/2006/main" type="twoObj" preserve="1">
   <p:cSld name="Two Content">
     <p:spTree>
@@ -2825,7 +2334,7 @@
 </p:sldLayout>
 </file>
 
-<file path=ppt/slideLayouts/slideLayout8.xml><?xml version="1.0" encoding="utf-8"?>
+<file path=ppt/slideLayouts/slideLayout9.xml><?xml version="1.0" encoding="utf-8"?>
 <p:sldLayout xmlns:a="http://schemas.openxmlformats.org/drawingml/2006/main" xmlns:r="http://schemas.openxmlformats.org/officeDocument/2006/relationships" xmlns:p="http://schemas.openxmlformats.org/presentationml/2006/main" type="titleOnly" preserve="1">
   <p:cSld name="Title Only">
     <p:spTree>
@@ -2868,36 +2377,6 @@
     <p:extLst>
       <p:ext uri="{BB962C8B-B14F-4D97-AF65-F5344CB8AC3E}">
         <p14:creationId xmlns:p14="http://schemas.microsoft.com/office/powerpoint/2010/main" val="694758501"/>
-      </p:ext>
-    </p:extLst>
-  </p:cSld>
-  <p:clrMapOvr>
-    <a:masterClrMapping/>
-  </p:clrMapOvr>
-</p:sldLayout>
-</file>
-
-<file path=ppt/slideLayouts/slideLayout9.xml><?xml version="1.0" encoding="utf-8"?>
-<p:sldLayout xmlns:a="http://schemas.openxmlformats.org/drawingml/2006/main" xmlns:r="http://schemas.openxmlformats.org/officeDocument/2006/relationships" xmlns:p="http://schemas.openxmlformats.org/presentationml/2006/main" type="blank" preserve="1">
-  <p:cSld name="Blank">
-    <p:spTree>
-      <p:nvGrpSpPr>
-        <p:cNvPr id="1" name=""/>
-        <p:cNvGrpSpPr/>
-        <p:nvPr/>
-      </p:nvGrpSpPr>
-      <p:grpSpPr>
-        <a:xfrm>
-          <a:off x="0" y="0"/>
-          <a:ext cx="0" cy="0"/>
-          <a:chOff x="0" y="0"/>
-          <a:chExt cx="0" cy="0"/>
-        </a:xfrm>
-      </p:grpSpPr>
-    </p:spTree>
-    <p:extLst>
-      <p:ext uri="{BB962C8B-B14F-4D97-AF65-F5344CB8AC3E}">
-        <p14:creationId xmlns:p14="http://schemas.microsoft.com/office/powerpoint/2010/main" val="1244902796"/>
       </p:ext>
     </p:extLst>
   </p:cSld>
@@ -2946,6 +2425,7 @@
     <p:sldLayoutId id="2147483713" r:id="rId3"/>
     <p:sldLayoutId id="2147483701" r:id="rId4"/>
     <p:sldLayoutId id="2147483702" r:id="rId5"/>
+    <p:sldLayoutId id="2147483714" r:id="rId6"/>
   </p:sldLayoutIdLst>
   <p:hf sldNum="0" hdr="0" ftr="0" dt="0"/>
   <p:txStyles>
@@ -3815,7 +3295,1276 @@
 </p:sld>
 </file>
 
-<file path=ppt/slides/slide10.xml><?xml version="1.0" encoding="utf-8"?>
+<file path=ppt/slides/slide2.xml><?xml version="1.0" encoding="utf-8"?>
+<p:sld xmlns:a="http://schemas.openxmlformats.org/drawingml/2006/main" xmlns:r="http://schemas.openxmlformats.org/officeDocument/2006/relationships" xmlns:p="http://schemas.openxmlformats.org/presentationml/2006/main">
+  <p:cSld>
+    <p:bg>
+      <p:bgPr>
+        <a:solidFill>
+          <a:schemeClr val="accent4">
+            <a:lumMod val="25000"/>
+          </a:schemeClr>
+        </a:solidFill>
+        <a:effectLst/>
+      </p:bgPr>
+    </p:bg>
+    <p:spTree>
+      <p:nvGrpSpPr>
+        <p:cNvPr id="1" name="">
+          <a:extLst>
+            <a:ext uri="{FF2B5EF4-FFF2-40B4-BE49-F238E27FC236}">
+              <a16:creationId xmlns:a16="http://schemas.microsoft.com/office/drawing/2014/main" id="{D4D64D80-A126-C883-510E-26D4F2060F91}"/>
+            </a:ext>
+          </a:extLst>
+        </p:cNvPr>
+        <p:cNvGrpSpPr/>
+        <p:nvPr/>
+      </p:nvGrpSpPr>
+      <p:grpSpPr>
+        <a:xfrm>
+          <a:off x="0" y="0"/>
+          <a:ext cx="0" cy="0"/>
+          <a:chOff x="0" y="0"/>
+          <a:chExt cx="0" cy="0"/>
+        </a:xfrm>
+      </p:grpSpPr>
+      <p:sp>
+        <p:nvSpPr>
+          <p:cNvPr id="2" name="Text Placeholder 1">
+            <a:extLst>
+              <a:ext uri="{FF2B5EF4-FFF2-40B4-BE49-F238E27FC236}">
+                <a16:creationId xmlns:a16="http://schemas.microsoft.com/office/drawing/2014/main" id="{56BB028E-210D-C2C4-FDAC-78E1617C29BD}"/>
+              </a:ext>
+            </a:extLst>
+          </p:cNvPr>
+          <p:cNvSpPr>
+            <a:spLocks noGrp="1"/>
+          </p:cNvSpPr>
+          <p:nvPr>
+            <p:ph type="body" sz="quarter" idx="12"/>
+          </p:nvPr>
+        </p:nvSpPr>
+        <p:spPr>
+          <a:xfrm>
+            <a:off x="2757376" y="6096225"/>
+            <a:ext cx="9899845" cy="1289311"/>
+          </a:xfrm>
+        </p:spPr>
+        <p:txBody>
+          <a:bodyPr/>
+          <a:lstStyle/>
+          <a:p>
+            <a:r>
+              <a:rPr lang="en-US" b="1" dirty="0"/>
+              <a:t>New in C# 14</a:t>
+            </a:r>
+          </a:p>
+        </p:txBody>
+      </p:sp>
+      <p:sp>
+        <p:nvSpPr>
+          <p:cNvPr id="3" name="Text Placeholder 2">
+            <a:extLst>
+              <a:ext uri="{FF2B5EF4-FFF2-40B4-BE49-F238E27FC236}">
+                <a16:creationId xmlns:a16="http://schemas.microsoft.com/office/drawing/2014/main" id="{6ADA93F0-C53A-19C9-3730-F7D10E2CC2FE}"/>
+              </a:ext>
+            </a:extLst>
+          </p:cNvPr>
+          <p:cNvSpPr>
+            <a:spLocks noGrp="1"/>
+          </p:cNvSpPr>
+          <p:nvPr>
+            <p:ph type="body" sz="quarter" idx="19"/>
+          </p:nvPr>
+        </p:nvSpPr>
+        <p:spPr/>
+        <p:txBody>
+          <a:bodyPr/>
+          <a:lstStyle/>
+          <a:p>
+            <a:r>
+              <a:rPr lang="en-US" b="1">
+                <a:solidFill>
+                  <a:schemeClr val="bg2"/>
+                </a:solidFill>
+              </a:rPr>
+              <a:t>01</a:t>
+            </a:r>
+          </a:p>
+        </p:txBody>
+      </p:sp>
+    </p:spTree>
+    <p:extLst>
+      <p:ext uri="{BB962C8B-B14F-4D97-AF65-F5344CB8AC3E}">
+        <p14:creationId xmlns:p14="http://schemas.microsoft.com/office/powerpoint/2010/main" val="3285160243"/>
+      </p:ext>
+    </p:extLst>
+  </p:cSld>
+  <p:clrMapOvr>
+    <a:masterClrMapping/>
+  </p:clrMapOvr>
+</p:sld>
+</file>
+
+<file path=ppt/slides/slide3.xml><?xml version="1.0" encoding="utf-8"?>
+<p:sld xmlns:a="http://schemas.openxmlformats.org/drawingml/2006/main" xmlns:r="http://schemas.openxmlformats.org/officeDocument/2006/relationships" xmlns:p="http://schemas.openxmlformats.org/presentationml/2006/main">
+  <p:cSld>
+    <p:spTree>
+      <p:nvGrpSpPr>
+        <p:cNvPr id="1" name=""/>
+        <p:cNvGrpSpPr/>
+        <p:nvPr/>
+      </p:nvGrpSpPr>
+      <p:grpSpPr>
+        <a:xfrm>
+          <a:off x="0" y="0"/>
+          <a:ext cx="0" cy="0"/>
+          <a:chOff x="0" y="0"/>
+          <a:chExt cx="0" cy="0"/>
+        </a:xfrm>
+      </p:grpSpPr>
+      <p:sp>
+        <p:nvSpPr>
+          <p:cNvPr id="8" name="Rectangle: Rounded Corners 7">
+            <a:extLst>
+              <a:ext uri="{FF2B5EF4-FFF2-40B4-BE49-F238E27FC236}">
+                <a16:creationId xmlns:a16="http://schemas.microsoft.com/office/drawing/2014/main" id="{FAC71E6E-506D-8E06-6123-EF86F045ED06}"/>
+              </a:ext>
+            </a:extLst>
+          </p:cNvPr>
+          <p:cNvSpPr/>
+          <p:nvPr/>
+        </p:nvSpPr>
+        <p:spPr>
+          <a:xfrm>
+            <a:off x="2377607" y="2069684"/>
+            <a:ext cx="8353893" cy="1409075"/>
+          </a:xfrm>
+          <a:prstGeom prst="roundRect">
+            <a:avLst/>
+          </a:prstGeom>
+          <a:solidFill>
+            <a:srgbClr val="7030A0"/>
+          </a:solidFill>
+        </p:spPr>
+        <p:style>
+          <a:lnRef idx="2">
+            <a:schemeClr val="accent1">
+              <a:shade val="15000"/>
+            </a:schemeClr>
+          </a:lnRef>
+          <a:fillRef idx="1">
+            <a:schemeClr val="accent1"/>
+          </a:fillRef>
+          <a:effectRef idx="0">
+            <a:schemeClr val="accent1"/>
+          </a:effectRef>
+          <a:fontRef idx="minor">
+            <a:schemeClr val="lt1"/>
+          </a:fontRef>
+        </p:style>
+        <p:txBody>
+          <a:bodyPr rtlCol="0" anchor="ctr"/>
+          <a:lstStyle/>
+          <a:p>
+            <a:pPr algn="ctr"/>
+            <a:r>
+              <a:rPr lang="en-US" sz="3200" dirty="0"/>
+              <a:t>Null-conditional assignment</a:t>
+            </a:r>
+            <a:endParaRPr lang="es-ES" sz="3200" dirty="0"/>
+          </a:p>
+        </p:txBody>
+      </p:sp>
+      <p:sp>
+        <p:nvSpPr>
+          <p:cNvPr id="9" name="Rectangle: Rounded Corners 8">
+            <a:extLst>
+              <a:ext uri="{FF2B5EF4-FFF2-40B4-BE49-F238E27FC236}">
+                <a16:creationId xmlns:a16="http://schemas.microsoft.com/office/drawing/2014/main" id="{9DAEC0D6-7F18-A378-3BB7-C92DB8DE9208}"/>
+              </a:ext>
+            </a:extLst>
+          </p:cNvPr>
+          <p:cNvSpPr/>
+          <p:nvPr/>
+        </p:nvSpPr>
+        <p:spPr>
+          <a:xfrm>
+            <a:off x="12639207" y="4292184"/>
+            <a:ext cx="8353893" cy="1409075"/>
+          </a:xfrm>
+          <a:prstGeom prst="roundRect">
+            <a:avLst/>
+          </a:prstGeom>
+          <a:solidFill>
+            <a:srgbClr val="7030A0"/>
+          </a:solidFill>
+        </p:spPr>
+        <p:style>
+          <a:lnRef idx="2">
+            <a:schemeClr val="accent1">
+              <a:shade val="15000"/>
+            </a:schemeClr>
+          </a:lnRef>
+          <a:fillRef idx="1">
+            <a:schemeClr val="accent1"/>
+          </a:fillRef>
+          <a:effectRef idx="0">
+            <a:schemeClr val="accent1"/>
+          </a:effectRef>
+          <a:fontRef idx="minor">
+            <a:schemeClr val="lt1"/>
+          </a:fontRef>
+        </p:style>
+        <p:txBody>
+          <a:bodyPr rtlCol="0" anchor="ctr"/>
+          <a:lstStyle/>
+          <a:p>
+            <a:pPr algn="ctr"/>
+            <a:r>
+              <a:rPr lang="en-US" sz="3200" dirty="0"/>
+              <a:t>User-defined compound assignment operators</a:t>
+            </a:r>
+            <a:endParaRPr lang="es-ES" sz="3200" dirty="0"/>
+          </a:p>
+        </p:txBody>
+      </p:sp>
+      <p:sp>
+        <p:nvSpPr>
+          <p:cNvPr id="10" name="Rectangle: Rounded Corners 9">
+            <a:extLst>
+              <a:ext uri="{FF2B5EF4-FFF2-40B4-BE49-F238E27FC236}">
+                <a16:creationId xmlns:a16="http://schemas.microsoft.com/office/drawing/2014/main" id="{D6C6662E-5AD3-2664-199D-FFD5FA545125}"/>
+              </a:ext>
+            </a:extLst>
+          </p:cNvPr>
+          <p:cNvSpPr/>
+          <p:nvPr/>
+        </p:nvSpPr>
+        <p:spPr>
+          <a:xfrm>
+            <a:off x="2377606" y="4292184"/>
+            <a:ext cx="8353893" cy="1409075"/>
+          </a:xfrm>
+          <a:prstGeom prst="roundRect">
+            <a:avLst/>
+          </a:prstGeom>
+          <a:solidFill>
+            <a:srgbClr val="7030A0"/>
+          </a:solidFill>
+        </p:spPr>
+        <p:style>
+          <a:lnRef idx="2">
+            <a:schemeClr val="accent1">
+              <a:shade val="15000"/>
+            </a:schemeClr>
+          </a:lnRef>
+          <a:fillRef idx="1">
+            <a:schemeClr val="accent1"/>
+          </a:fillRef>
+          <a:effectRef idx="0">
+            <a:schemeClr val="accent1"/>
+          </a:effectRef>
+          <a:fontRef idx="minor">
+            <a:schemeClr val="lt1"/>
+          </a:fontRef>
+        </p:style>
+        <p:txBody>
+          <a:bodyPr rtlCol="0" anchor="ctr"/>
+          <a:lstStyle/>
+          <a:p>
+            <a:pPr algn="ctr"/>
+            <a:r>
+              <a:rPr lang="en-US" sz="3200" dirty="0"/>
+              <a:t>Partial events and constructors</a:t>
+            </a:r>
+            <a:endParaRPr lang="es-ES" sz="3200" dirty="0"/>
+          </a:p>
+        </p:txBody>
+      </p:sp>
+      <p:sp>
+        <p:nvSpPr>
+          <p:cNvPr id="11" name="Rectangle: Rounded Corners 10">
+            <a:extLst>
+              <a:ext uri="{FF2B5EF4-FFF2-40B4-BE49-F238E27FC236}">
+                <a16:creationId xmlns:a16="http://schemas.microsoft.com/office/drawing/2014/main" id="{27A0ED8B-01A7-E318-0DAF-8A427194AB6C}"/>
+              </a:ext>
+            </a:extLst>
+          </p:cNvPr>
+          <p:cNvSpPr/>
+          <p:nvPr/>
+        </p:nvSpPr>
+        <p:spPr>
+          <a:xfrm>
+            <a:off x="12639207" y="2069684"/>
+            <a:ext cx="8353893" cy="1409075"/>
+          </a:xfrm>
+          <a:prstGeom prst="roundRect">
+            <a:avLst/>
+          </a:prstGeom>
+          <a:solidFill>
+            <a:srgbClr val="7030A0"/>
+          </a:solidFill>
+        </p:spPr>
+        <p:style>
+          <a:lnRef idx="2">
+            <a:schemeClr val="accent1">
+              <a:shade val="15000"/>
+            </a:schemeClr>
+          </a:lnRef>
+          <a:fillRef idx="1">
+            <a:schemeClr val="accent1"/>
+          </a:fillRef>
+          <a:effectRef idx="0">
+            <a:schemeClr val="accent1"/>
+          </a:effectRef>
+          <a:fontRef idx="minor">
+            <a:schemeClr val="lt1"/>
+          </a:fontRef>
+        </p:style>
+        <p:txBody>
+          <a:bodyPr rtlCol="0" anchor="ctr"/>
+          <a:lstStyle/>
+          <a:p>
+            <a:pPr algn="ctr"/>
+            <a:r>
+              <a:rPr lang="en-US" sz="3200" dirty="0"/>
+              <a:t>Field access in auto-properties</a:t>
+            </a:r>
+            <a:endParaRPr lang="es-ES" sz="3200" dirty="0"/>
+          </a:p>
+        </p:txBody>
+      </p:sp>
+      <p:sp>
+        <p:nvSpPr>
+          <p:cNvPr id="12" name="Rectangle: Rounded Corners 11">
+            <a:extLst>
+              <a:ext uri="{FF2B5EF4-FFF2-40B4-BE49-F238E27FC236}">
+                <a16:creationId xmlns:a16="http://schemas.microsoft.com/office/drawing/2014/main" id="{20E357C3-B200-B56C-9E45-245B05127D78}"/>
+              </a:ext>
+            </a:extLst>
+          </p:cNvPr>
+          <p:cNvSpPr/>
+          <p:nvPr/>
+        </p:nvSpPr>
+        <p:spPr>
+          <a:xfrm>
+            <a:off x="2377606" y="6514684"/>
+            <a:ext cx="8353893" cy="1409075"/>
+          </a:xfrm>
+          <a:prstGeom prst="roundRect">
+            <a:avLst/>
+          </a:prstGeom>
+          <a:solidFill>
+            <a:srgbClr val="7030A0"/>
+          </a:solidFill>
+        </p:spPr>
+        <p:style>
+          <a:lnRef idx="2">
+            <a:schemeClr val="accent1">
+              <a:shade val="15000"/>
+            </a:schemeClr>
+          </a:lnRef>
+          <a:fillRef idx="1">
+            <a:schemeClr val="accent1"/>
+          </a:fillRef>
+          <a:effectRef idx="0">
+            <a:schemeClr val="accent1"/>
+          </a:effectRef>
+          <a:fontRef idx="minor">
+            <a:schemeClr val="lt1"/>
+          </a:fontRef>
+        </p:style>
+        <p:txBody>
+          <a:bodyPr rtlCol="0" anchor="ctr"/>
+          <a:lstStyle/>
+          <a:p>
+            <a:pPr algn="ctr"/>
+            <a:r>
+              <a:rPr lang="en-US" sz="3200" dirty="0"/>
+              <a:t>Extension members</a:t>
+            </a:r>
+            <a:endParaRPr lang="es-ES" sz="3200" dirty="0"/>
+          </a:p>
+        </p:txBody>
+      </p:sp>
+      <p:sp>
+        <p:nvSpPr>
+          <p:cNvPr id="13" name="Rectangle: Rounded Corners 12">
+            <a:extLst>
+              <a:ext uri="{FF2B5EF4-FFF2-40B4-BE49-F238E27FC236}">
+                <a16:creationId xmlns:a16="http://schemas.microsoft.com/office/drawing/2014/main" id="{A38E6E29-A359-4DDF-7728-0E50FAC8F8B6}"/>
+              </a:ext>
+            </a:extLst>
+          </p:cNvPr>
+          <p:cNvSpPr/>
+          <p:nvPr/>
+        </p:nvSpPr>
+        <p:spPr>
+          <a:xfrm>
+            <a:off x="12639205" y="6514684"/>
+            <a:ext cx="8353893" cy="1409075"/>
+          </a:xfrm>
+          <a:prstGeom prst="roundRect">
+            <a:avLst/>
+          </a:prstGeom>
+          <a:solidFill>
+            <a:srgbClr val="7030A0"/>
+          </a:solidFill>
+        </p:spPr>
+        <p:style>
+          <a:lnRef idx="2">
+            <a:schemeClr val="accent1">
+              <a:shade val="15000"/>
+            </a:schemeClr>
+          </a:lnRef>
+          <a:fillRef idx="1">
+            <a:schemeClr val="accent1"/>
+          </a:fillRef>
+          <a:effectRef idx="0">
+            <a:schemeClr val="accent1"/>
+          </a:effectRef>
+          <a:fontRef idx="minor">
+            <a:schemeClr val="lt1"/>
+          </a:fontRef>
+        </p:style>
+        <p:txBody>
+          <a:bodyPr rtlCol="0" anchor="ctr"/>
+          <a:lstStyle/>
+          <a:p>
+            <a:pPr algn="ctr"/>
+            <a:r>
+              <a:rPr lang="en-US" sz="3200" dirty="0"/>
+              <a:t>Extension operators</a:t>
+            </a:r>
+            <a:endParaRPr lang="es-ES" sz="3200" dirty="0"/>
+          </a:p>
+        </p:txBody>
+      </p:sp>
+      <p:sp>
+        <p:nvSpPr>
+          <p:cNvPr id="14" name="Rectangle: Rounded Corners 13">
+            <a:extLst>
+              <a:ext uri="{FF2B5EF4-FFF2-40B4-BE49-F238E27FC236}">
+                <a16:creationId xmlns:a16="http://schemas.microsoft.com/office/drawing/2014/main" id="{9DB4C7B9-A3FA-65A6-1866-FF870C70347C}"/>
+              </a:ext>
+            </a:extLst>
+          </p:cNvPr>
+          <p:cNvSpPr/>
+          <p:nvPr/>
+        </p:nvSpPr>
+        <p:spPr>
+          <a:xfrm>
+            <a:off x="2377605" y="8648284"/>
+            <a:ext cx="8353893" cy="1409075"/>
+          </a:xfrm>
+          <a:prstGeom prst="roundRect">
+            <a:avLst/>
+          </a:prstGeom>
+          <a:solidFill>
+            <a:srgbClr val="7030A0"/>
+          </a:solidFill>
+        </p:spPr>
+        <p:style>
+          <a:lnRef idx="2">
+            <a:schemeClr val="accent1">
+              <a:shade val="15000"/>
+            </a:schemeClr>
+          </a:lnRef>
+          <a:fillRef idx="1">
+            <a:schemeClr val="accent1"/>
+          </a:fillRef>
+          <a:effectRef idx="0">
+            <a:schemeClr val="accent1"/>
+          </a:effectRef>
+          <a:fontRef idx="minor">
+            <a:schemeClr val="lt1"/>
+          </a:fontRef>
+        </p:style>
+        <p:txBody>
+          <a:bodyPr rtlCol="0" anchor="ctr"/>
+          <a:lstStyle/>
+          <a:p>
+            <a:pPr algn="ctr"/>
+            <a:r>
+              <a:rPr lang="en-US" sz="3200" dirty="0"/>
+              <a:t>Unbound generic types in “</a:t>
+            </a:r>
+            <a:r>
+              <a:rPr lang="en-US" sz="3200" dirty="0" err="1"/>
+              <a:t>nameof</a:t>
+            </a:r>
+            <a:r>
+              <a:rPr lang="en-US" sz="3200" dirty="0"/>
+              <a:t>()”</a:t>
+            </a:r>
+            <a:endParaRPr lang="es-ES" sz="3200" dirty="0"/>
+          </a:p>
+        </p:txBody>
+      </p:sp>
+      <p:sp>
+        <p:nvSpPr>
+          <p:cNvPr id="15" name="Rectangle: Rounded Corners 14">
+            <a:extLst>
+              <a:ext uri="{FF2B5EF4-FFF2-40B4-BE49-F238E27FC236}">
+                <a16:creationId xmlns:a16="http://schemas.microsoft.com/office/drawing/2014/main" id="{C56AB685-A61C-2909-4324-E34BA63EABE3}"/>
+              </a:ext>
+            </a:extLst>
+          </p:cNvPr>
+          <p:cNvSpPr/>
+          <p:nvPr/>
+        </p:nvSpPr>
+        <p:spPr>
+          <a:xfrm>
+            <a:off x="12639206" y="8648284"/>
+            <a:ext cx="8353893" cy="1409075"/>
+          </a:xfrm>
+          <a:prstGeom prst="roundRect">
+            <a:avLst/>
+          </a:prstGeom>
+          <a:solidFill>
+            <a:srgbClr val="7030A0"/>
+          </a:solidFill>
+        </p:spPr>
+        <p:style>
+          <a:lnRef idx="2">
+            <a:schemeClr val="accent1">
+              <a:shade val="15000"/>
+            </a:schemeClr>
+          </a:lnRef>
+          <a:fillRef idx="1">
+            <a:schemeClr val="accent1"/>
+          </a:fillRef>
+          <a:effectRef idx="0">
+            <a:schemeClr val="accent1"/>
+          </a:effectRef>
+          <a:fontRef idx="minor">
+            <a:schemeClr val="lt1"/>
+          </a:fontRef>
+        </p:style>
+        <p:txBody>
+          <a:bodyPr rtlCol="0" anchor="ctr"/>
+          <a:lstStyle/>
+          <a:p>
+            <a:pPr algn="ctr"/>
+            <a:r>
+              <a:rPr lang="en-US" sz="3200" dirty="0"/>
+              <a:t>Simple lambda parameters with modifiers</a:t>
+            </a:r>
+            <a:endParaRPr lang="es-ES" sz="3200" dirty="0"/>
+          </a:p>
+        </p:txBody>
+      </p:sp>
+      <p:sp>
+        <p:nvSpPr>
+          <p:cNvPr id="2" name="Rectangle: Rounded Corners 1">
+            <a:extLst>
+              <a:ext uri="{FF2B5EF4-FFF2-40B4-BE49-F238E27FC236}">
+                <a16:creationId xmlns:a16="http://schemas.microsoft.com/office/drawing/2014/main" id="{4769A4FE-DFD8-0675-26C1-8827B1C3C158}"/>
+              </a:ext>
+            </a:extLst>
+          </p:cNvPr>
+          <p:cNvSpPr/>
+          <p:nvPr/>
+        </p:nvSpPr>
+        <p:spPr>
+          <a:xfrm>
+            <a:off x="7508406" y="10629484"/>
+            <a:ext cx="8353893" cy="1409075"/>
+          </a:xfrm>
+          <a:prstGeom prst="roundRect">
+            <a:avLst/>
+          </a:prstGeom>
+          <a:solidFill>
+            <a:srgbClr val="7030A0"/>
+          </a:solidFill>
+        </p:spPr>
+        <p:style>
+          <a:lnRef idx="2">
+            <a:schemeClr val="accent1">
+              <a:shade val="15000"/>
+            </a:schemeClr>
+          </a:lnRef>
+          <a:fillRef idx="1">
+            <a:schemeClr val="accent1"/>
+          </a:fillRef>
+          <a:effectRef idx="0">
+            <a:schemeClr val="accent1"/>
+          </a:effectRef>
+          <a:fontRef idx="minor">
+            <a:schemeClr val="lt1"/>
+          </a:fontRef>
+        </p:style>
+        <p:txBody>
+          <a:bodyPr rtlCol="0" anchor="ctr"/>
+          <a:lstStyle/>
+          <a:p>
+            <a:pPr algn="ctr"/>
+            <a:r>
+              <a:rPr lang="en-US" sz="3200" dirty="0"/>
+              <a:t>Streamline Span&lt;T&gt; Usage with Implicit Conversions</a:t>
+            </a:r>
+            <a:endParaRPr lang="es-ES" sz="3200" dirty="0"/>
+          </a:p>
+        </p:txBody>
+      </p:sp>
+    </p:spTree>
+    <p:extLst>
+      <p:ext uri="{BB962C8B-B14F-4D97-AF65-F5344CB8AC3E}">
+        <p14:creationId xmlns:p14="http://schemas.microsoft.com/office/powerpoint/2010/main" val="2764486210"/>
+      </p:ext>
+    </p:extLst>
+  </p:cSld>
+  <p:clrMapOvr>
+    <a:masterClrMapping/>
+  </p:clrMapOvr>
+</p:sld>
+</file>
+
+<file path=ppt/slides/slide4.xml><?xml version="1.0" encoding="utf-8"?>
+<p:sld xmlns:a="http://schemas.openxmlformats.org/drawingml/2006/main" xmlns:r="http://schemas.openxmlformats.org/officeDocument/2006/relationships" xmlns:p="http://schemas.openxmlformats.org/presentationml/2006/main">
+  <p:cSld>
+    <p:bg>
+      <p:bgPr>
+        <a:solidFill>
+          <a:schemeClr val="accent4">
+            <a:lumMod val="25000"/>
+          </a:schemeClr>
+        </a:solidFill>
+        <a:effectLst/>
+      </p:bgPr>
+    </p:bg>
+    <p:spTree>
+      <p:nvGrpSpPr>
+        <p:cNvPr id="1" name="">
+          <a:extLst>
+            <a:ext uri="{FF2B5EF4-FFF2-40B4-BE49-F238E27FC236}">
+              <a16:creationId xmlns:a16="http://schemas.microsoft.com/office/drawing/2014/main" id="{93EB95C8-0BA6-9F1F-3439-59264533682C}"/>
+            </a:ext>
+          </a:extLst>
+        </p:cNvPr>
+        <p:cNvGrpSpPr/>
+        <p:nvPr/>
+      </p:nvGrpSpPr>
+      <p:grpSpPr>
+        <a:xfrm>
+          <a:off x="0" y="0"/>
+          <a:ext cx="0" cy="0"/>
+          <a:chOff x="0" y="0"/>
+          <a:chExt cx="0" cy="0"/>
+        </a:xfrm>
+      </p:grpSpPr>
+      <p:sp>
+        <p:nvSpPr>
+          <p:cNvPr id="2" name="Text Placeholder 1">
+            <a:extLst>
+              <a:ext uri="{FF2B5EF4-FFF2-40B4-BE49-F238E27FC236}">
+                <a16:creationId xmlns:a16="http://schemas.microsoft.com/office/drawing/2014/main" id="{4C90D896-23B7-D850-DFE2-D532153132D2}"/>
+              </a:ext>
+            </a:extLst>
+          </p:cNvPr>
+          <p:cNvSpPr>
+            <a:spLocks noGrp="1"/>
+          </p:cNvSpPr>
+          <p:nvPr>
+            <p:ph type="body" sz="quarter" idx="12"/>
+          </p:nvPr>
+        </p:nvSpPr>
+        <p:spPr>
+          <a:xfrm>
+            <a:off x="2757376" y="6096225"/>
+            <a:ext cx="11784124" cy="1289311"/>
+          </a:xfrm>
+        </p:spPr>
+        <p:txBody>
+          <a:bodyPr/>
+          <a:lstStyle/>
+          <a:p>
+            <a:r>
+              <a:rPr lang="en-US" b="1" dirty="0"/>
+              <a:t>New in EF Core 10</a:t>
+            </a:r>
+          </a:p>
+        </p:txBody>
+      </p:sp>
+      <p:sp>
+        <p:nvSpPr>
+          <p:cNvPr id="3" name="Text Placeholder 2">
+            <a:extLst>
+              <a:ext uri="{FF2B5EF4-FFF2-40B4-BE49-F238E27FC236}">
+                <a16:creationId xmlns:a16="http://schemas.microsoft.com/office/drawing/2014/main" id="{EEB0A1D8-D729-BE40-2C85-395EBF26C1D5}"/>
+              </a:ext>
+            </a:extLst>
+          </p:cNvPr>
+          <p:cNvSpPr>
+            <a:spLocks noGrp="1"/>
+          </p:cNvSpPr>
+          <p:nvPr>
+            <p:ph type="body" sz="quarter" idx="19"/>
+          </p:nvPr>
+        </p:nvSpPr>
+        <p:spPr>
+          <a:xfrm>
+            <a:off x="1039104" y="6096226"/>
+            <a:ext cx="1718271" cy="1289312"/>
+          </a:xfrm>
+        </p:spPr>
+        <p:txBody>
+          <a:bodyPr/>
+          <a:lstStyle/>
+          <a:p>
+            <a:r>
+              <a:rPr lang="en-US" b="1" dirty="0">
+                <a:solidFill>
+                  <a:schemeClr val="bg2"/>
+                </a:solidFill>
+              </a:rPr>
+              <a:t>02</a:t>
+            </a:r>
+          </a:p>
+        </p:txBody>
+      </p:sp>
+    </p:spTree>
+    <p:extLst>
+      <p:ext uri="{BB962C8B-B14F-4D97-AF65-F5344CB8AC3E}">
+        <p14:creationId xmlns:p14="http://schemas.microsoft.com/office/powerpoint/2010/main" val="3166214339"/>
+      </p:ext>
+    </p:extLst>
+  </p:cSld>
+  <p:clrMapOvr>
+    <a:masterClrMapping/>
+  </p:clrMapOvr>
+</p:sld>
+</file>
+
+<file path=ppt/slides/slide5.xml><?xml version="1.0" encoding="utf-8"?>
+<p:sld xmlns:a="http://schemas.openxmlformats.org/drawingml/2006/main" xmlns:r="http://schemas.openxmlformats.org/officeDocument/2006/relationships" xmlns:p="http://schemas.openxmlformats.org/presentationml/2006/main">
+  <p:cSld>
+    <p:spTree>
+      <p:nvGrpSpPr>
+        <p:cNvPr id="1" name="">
+          <a:extLst>
+            <a:ext uri="{FF2B5EF4-FFF2-40B4-BE49-F238E27FC236}">
+              <a16:creationId xmlns:a16="http://schemas.microsoft.com/office/drawing/2014/main" id="{92D0A90E-0C24-A62E-CEEE-F3FB4E6CF104}"/>
+            </a:ext>
+          </a:extLst>
+        </p:cNvPr>
+        <p:cNvGrpSpPr/>
+        <p:nvPr/>
+      </p:nvGrpSpPr>
+      <p:grpSpPr>
+        <a:xfrm>
+          <a:off x="0" y="0"/>
+          <a:ext cx="0" cy="0"/>
+          <a:chOff x="0" y="0"/>
+          <a:chExt cx="0" cy="0"/>
+        </a:xfrm>
+      </p:grpSpPr>
+      <p:sp>
+        <p:nvSpPr>
+          <p:cNvPr id="8" name="Rectangle: Rounded Corners 7">
+            <a:extLst>
+              <a:ext uri="{FF2B5EF4-FFF2-40B4-BE49-F238E27FC236}">
+                <a16:creationId xmlns:a16="http://schemas.microsoft.com/office/drawing/2014/main" id="{BDE7015E-25ED-730F-55CD-27716049027A}"/>
+              </a:ext>
+            </a:extLst>
+          </p:cNvPr>
+          <p:cNvSpPr/>
+          <p:nvPr/>
+        </p:nvSpPr>
+        <p:spPr>
+          <a:xfrm>
+            <a:off x="2377607" y="2069684"/>
+            <a:ext cx="8353893" cy="1409075"/>
+          </a:xfrm>
+          <a:prstGeom prst="roundRect">
+            <a:avLst/>
+          </a:prstGeom>
+          <a:solidFill>
+            <a:srgbClr val="7030A0"/>
+          </a:solidFill>
+        </p:spPr>
+        <p:style>
+          <a:lnRef idx="2">
+            <a:schemeClr val="accent1">
+              <a:shade val="15000"/>
+            </a:schemeClr>
+          </a:lnRef>
+          <a:fillRef idx="1">
+            <a:schemeClr val="accent1"/>
+          </a:fillRef>
+          <a:effectRef idx="0">
+            <a:schemeClr val="accent1"/>
+          </a:effectRef>
+          <a:fontRef idx="minor">
+            <a:schemeClr val="lt1"/>
+          </a:fontRef>
+        </p:style>
+        <p:txBody>
+          <a:bodyPr rtlCol="0" anchor="ctr"/>
+          <a:lstStyle/>
+          <a:p>
+            <a:pPr algn="ctr"/>
+            <a:r>
+              <a:rPr lang="en-US" sz="3200" dirty="0"/>
+              <a:t>Vector search support</a:t>
+            </a:r>
+            <a:endParaRPr lang="es-ES" sz="3200" dirty="0"/>
+          </a:p>
+        </p:txBody>
+      </p:sp>
+      <p:sp>
+        <p:nvSpPr>
+          <p:cNvPr id="9" name="Rectangle: Rounded Corners 8">
+            <a:extLst>
+              <a:ext uri="{FF2B5EF4-FFF2-40B4-BE49-F238E27FC236}">
+                <a16:creationId xmlns:a16="http://schemas.microsoft.com/office/drawing/2014/main" id="{AF0007C1-EFBA-6C1B-B135-58EF008A30E5}"/>
+              </a:ext>
+            </a:extLst>
+          </p:cNvPr>
+          <p:cNvSpPr/>
+          <p:nvPr/>
+        </p:nvSpPr>
+        <p:spPr>
+          <a:xfrm>
+            <a:off x="12639207" y="4292184"/>
+            <a:ext cx="8353893" cy="1409075"/>
+          </a:xfrm>
+          <a:prstGeom prst="roundRect">
+            <a:avLst/>
+          </a:prstGeom>
+          <a:solidFill>
+            <a:srgbClr val="7030A0"/>
+          </a:solidFill>
+        </p:spPr>
+        <p:style>
+          <a:lnRef idx="2">
+            <a:schemeClr val="accent1">
+              <a:shade val="15000"/>
+            </a:schemeClr>
+          </a:lnRef>
+          <a:fillRef idx="1">
+            <a:schemeClr val="accent1"/>
+          </a:fillRef>
+          <a:effectRef idx="0">
+            <a:schemeClr val="accent1"/>
+          </a:effectRef>
+          <a:fontRef idx="minor">
+            <a:schemeClr val="lt1"/>
+          </a:fontRef>
+        </p:style>
+        <p:txBody>
+          <a:bodyPr rtlCol="0" anchor="ctr"/>
+          <a:lstStyle/>
+          <a:p>
+            <a:pPr algn="ctr"/>
+            <a:r>
+              <a:rPr lang="en-US" sz="3200" dirty="0"/>
+              <a:t>Full-text and hybrid search support</a:t>
+            </a:r>
+            <a:endParaRPr lang="es-ES" sz="3200" dirty="0"/>
+          </a:p>
+        </p:txBody>
+      </p:sp>
+      <p:sp>
+        <p:nvSpPr>
+          <p:cNvPr id="10" name="Rectangle: Rounded Corners 9">
+            <a:extLst>
+              <a:ext uri="{FF2B5EF4-FFF2-40B4-BE49-F238E27FC236}">
+                <a16:creationId xmlns:a16="http://schemas.microsoft.com/office/drawing/2014/main" id="{9EAED3B0-47E1-F8A5-E172-046D2E1F4E46}"/>
+              </a:ext>
+            </a:extLst>
+          </p:cNvPr>
+          <p:cNvSpPr/>
+          <p:nvPr/>
+        </p:nvSpPr>
+        <p:spPr>
+          <a:xfrm>
+            <a:off x="2377606" y="4292184"/>
+            <a:ext cx="8353893" cy="1409075"/>
+          </a:xfrm>
+          <a:prstGeom prst="roundRect">
+            <a:avLst/>
+          </a:prstGeom>
+          <a:solidFill>
+            <a:srgbClr val="7030A0"/>
+          </a:solidFill>
+        </p:spPr>
+        <p:style>
+          <a:lnRef idx="2">
+            <a:schemeClr val="accent1">
+              <a:shade val="15000"/>
+            </a:schemeClr>
+          </a:lnRef>
+          <a:fillRef idx="1">
+            <a:schemeClr val="accent1"/>
+          </a:fillRef>
+          <a:effectRef idx="0">
+            <a:schemeClr val="accent1"/>
+          </a:effectRef>
+          <a:fontRef idx="minor">
+            <a:schemeClr val="lt1"/>
+          </a:fontRef>
+        </p:style>
+        <p:txBody>
+          <a:bodyPr rtlCol="0" anchor="ctr"/>
+          <a:lstStyle/>
+          <a:p>
+            <a:pPr algn="ctr"/>
+            <a:r>
+              <a:rPr lang="en-US" sz="3200" dirty="0"/>
+              <a:t>Custom default constraint names</a:t>
+            </a:r>
+            <a:endParaRPr lang="es-ES" sz="3200" dirty="0"/>
+          </a:p>
+        </p:txBody>
+      </p:sp>
+      <p:sp>
+        <p:nvSpPr>
+          <p:cNvPr id="11" name="Rectangle: Rounded Corners 10">
+            <a:extLst>
+              <a:ext uri="{FF2B5EF4-FFF2-40B4-BE49-F238E27FC236}">
+                <a16:creationId xmlns:a16="http://schemas.microsoft.com/office/drawing/2014/main" id="{9F7A6213-0392-9685-482C-FA233B2EE481}"/>
+              </a:ext>
+            </a:extLst>
+          </p:cNvPr>
+          <p:cNvSpPr/>
+          <p:nvPr/>
+        </p:nvSpPr>
+        <p:spPr>
+          <a:xfrm>
+            <a:off x="12639207" y="2069684"/>
+            <a:ext cx="8353893" cy="1409075"/>
+          </a:xfrm>
+          <a:prstGeom prst="roundRect">
+            <a:avLst/>
+          </a:prstGeom>
+          <a:solidFill>
+            <a:srgbClr val="7030A0"/>
+          </a:solidFill>
+        </p:spPr>
+        <p:style>
+          <a:lnRef idx="2">
+            <a:schemeClr val="accent1">
+              <a:shade val="15000"/>
+            </a:schemeClr>
+          </a:lnRef>
+          <a:fillRef idx="1">
+            <a:schemeClr val="accent1"/>
+          </a:fillRef>
+          <a:effectRef idx="0">
+            <a:schemeClr val="accent1"/>
+          </a:effectRef>
+          <a:fontRef idx="minor">
+            <a:schemeClr val="lt1"/>
+          </a:fontRef>
+        </p:style>
+        <p:txBody>
+          <a:bodyPr rtlCol="0" anchor="ctr"/>
+          <a:lstStyle/>
+          <a:p>
+            <a:pPr algn="ctr"/>
+            <a:r>
+              <a:rPr lang="en-US" sz="3200" dirty="0"/>
+              <a:t>JSON type support</a:t>
+            </a:r>
+            <a:endParaRPr lang="es-ES" sz="3200" dirty="0"/>
+          </a:p>
+        </p:txBody>
+      </p:sp>
+      <p:sp>
+        <p:nvSpPr>
+          <p:cNvPr id="12" name="Rectangle: Rounded Corners 11">
+            <a:extLst>
+              <a:ext uri="{FF2B5EF4-FFF2-40B4-BE49-F238E27FC236}">
+                <a16:creationId xmlns:a16="http://schemas.microsoft.com/office/drawing/2014/main" id="{494673DB-E8B0-9C62-09A0-DE43B7F70AF0}"/>
+              </a:ext>
+            </a:extLst>
+          </p:cNvPr>
+          <p:cNvSpPr/>
+          <p:nvPr/>
+        </p:nvSpPr>
+        <p:spPr>
+          <a:xfrm>
+            <a:off x="2377606" y="6514684"/>
+            <a:ext cx="8353893" cy="1409075"/>
+          </a:xfrm>
+          <a:prstGeom prst="roundRect">
+            <a:avLst/>
+          </a:prstGeom>
+          <a:solidFill>
+            <a:srgbClr val="7030A0"/>
+          </a:solidFill>
+        </p:spPr>
+        <p:style>
+          <a:lnRef idx="2">
+            <a:schemeClr val="accent1">
+              <a:shade val="15000"/>
+            </a:schemeClr>
+          </a:lnRef>
+          <a:fillRef idx="1">
+            <a:schemeClr val="accent1"/>
+          </a:fillRef>
+          <a:effectRef idx="0">
+            <a:schemeClr val="accent1"/>
+          </a:effectRef>
+          <a:fontRef idx="minor">
+            <a:schemeClr val="lt1"/>
+          </a:fontRef>
+        </p:style>
+        <p:txBody>
+          <a:bodyPr rtlCol="0" anchor="ctr"/>
+          <a:lstStyle/>
+          <a:p>
+            <a:pPr algn="ctr"/>
+            <a:r>
+              <a:rPr lang="en-US" sz="3200" dirty="0"/>
+              <a:t>Complex types:  Table Splitting</a:t>
+            </a:r>
+          </a:p>
+        </p:txBody>
+      </p:sp>
+      <p:sp>
+        <p:nvSpPr>
+          <p:cNvPr id="13" name="Rectangle: Rounded Corners 12">
+            <a:extLst>
+              <a:ext uri="{FF2B5EF4-FFF2-40B4-BE49-F238E27FC236}">
+                <a16:creationId xmlns:a16="http://schemas.microsoft.com/office/drawing/2014/main" id="{DB9A407F-F129-F0BA-0DA2-2A4F8F8B8998}"/>
+              </a:ext>
+            </a:extLst>
+          </p:cNvPr>
+          <p:cNvSpPr/>
+          <p:nvPr/>
+        </p:nvSpPr>
+        <p:spPr>
+          <a:xfrm>
+            <a:off x="12639205" y="6514684"/>
+            <a:ext cx="8353893" cy="1409075"/>
+          </a:xfrm>
+          <a:prstGeom prst="roundRect">
+            <a:avLst/>
+          </a:prstGeom>
+          <a:solidFill>
+            <a:srgbClr val="7030A0"/>
+          </a:solidFill>
+        </p:spPr>
+        <p:style>
+          <a:lnRef idx="2">
+            <a:schemeClr val="accent1">
+              <a:shade val="15000"/>
+            </a:schemeClr>
+          </a:lnRef>
+          <a:fillRef idx="1">
+            <a:schemeClr val="accent1"/>
+          </a:fillRef>
+          <a:effectRef idx="0">
+            <a:schemeClr val="accent1"/>
+          </a:effectRef>
+          <a:fontRef idx="minor">
+            <a:schemeClr val="lt1"/>
+          </a:fontRef>
+        </p:style>
+        <p:txBody>
+          <a:bodyPr rtlCol="0" anchor="ctr"/>
+          <a:lstStyle/>
+          <a:p>
+            <a:pPr algn="ctr"/>
+            <a:r>
+              <a:rPr lang="en-US" sz="3200" dirty="0"/>
+              <a:t>Complex types: Mapping to JSON</a:t>
+            </a:r>
+            <a:endParaRPr lang="es-ES" sz="3200" dirty="0"/>
+          </a:p>
+        </p:txBody>
+      </p:sp>
+      <p:sp>
+        <p:nvSpPr>
+          <p:cNvPr id="14" name="Rectangle: Rounded Corners 13">
+            <a:extLst>
+              <a:ext uri="{FF2B5EF4-FFF2-40B4-BE49-F238E27FC236}">
+                <a16:creationId xmlns:a16="http://schemas.microsoft.com/office/drawing/2014/main" id="{6AEAB247-F8B3-D9B1-C28A-EECE6949CC38}"/>
+              </a:ext>
+            </a:extLst>
+          </p:cNvPr>
+          <p:cNvSpPr/>
+          <p:nvPr/>
+        </p:nvSpPr>
+        <p:spPr>
+          <a:xfrm>
+            <a:off x="2377605" y="8648284"/>
+            <a:ext cx="8353893" cy="1409075"/>
+          </a:xfrm>
+          <a:prstGeom prst="roundRect">
+            <a:avLst/>
+          </a:prstGeom>
+          <a:solidFill>
+            <a:srgbClr val="7030A0"/>
+          </a:solidFill>
+        </p:spPr>
+        <p:style>
+          <a:lnRef idx="2">
+            <a:schemeClr val="accent1">
+              <a:shade val="15000"/>
+            </a:schemeClr>
+          </a:lnRef>
+          <a:fillRef idx="1">
+            <a:schemeClr val="accent1"/>
+          </a:fillRef>
+          <a:effectRef idx="0">
+            <a:schemeClr val="accent1"/>
+          </a:effectRef>
+          <a:fontRef idx="minor">
+            <a:schemeClr val="lt1"/>
+          </a:fontRef>
+        </p:style>
+        <p:txBody>
+          <a:bodyPr rtlCol="0" anchor="ctr"/>
+          <a:lstStyle/>
+          <a:p>
+            <a:pPr algn="ctr"/>
+            <a:r>
+              <a:rPr lang="en-US" sz="3200" dirty="0"/>
+              <a:t>Support for the .NET 10 </a:t>
+            </a:r>
+            <a:r>
+              <a:rPr lang="en-US" sz="3200" dirty="0" err="1"/>
+              <a:t>LeftJoin</a:t>
+            </a:r>
+            <a:r>
+              <a:rPr lang="en-US" sz="3200" dirty="0"/>
+              <a:t> and </a:t>
+            </a:r>
+            <a:r>
+              <a:rPr lang="en-US" sz="3200" dirty="0" err="1"/>
+              <a:t>RightJoin</a:t>
+            </a:r>
+            <a:r>
+              <a:rPr lang="en-US" sz="3200" dirty="0"/>
+              <a:t> operators</a:t>
+            </a:r>
+            <a:endParaRPr lang="es-ES" sz="3200" dirty="0"/>
+          </a:p>
+        </p:txBody>
+      </p:sp>
+      <p:sp>
+        <p:nvSpPr>
+          <p:cNvPr id="15" name="Rectangle: Rounded Corners 14">
+            <a:extLst>
+              <a:ext uri="{FF2B5EF4-FFF2-40B4-BE49-F238E27FC236}">
+                <a16:creationId xmlns:a16="http://schemas.microsoft.com/office/drawing/2014/main" id="{92EF2266-86D1-3103-B65E-C28726A52726}"/>
+              </a:ext>
+            </a:extLst>
+          </p:cNvPr>
+          <p:cNvSpPr/>
+          <p:nvPr/>
+        </p:nvSpPr>
+        <p:spPr>
+          <a:xfrm>
+            <a:off x="12639206" y="8648284"/>
+            <a:ext cx="8353893" cy="1409075"/>
+          </a:xfrm>
+          <a:prstGeom prst="roundRect">
+            <a:avLst/>
+          </a:prstGeom>
+          <a:solidFill>
+            <a:srgbClr val="7030A0"/>
+          </a:solidFill>
+        </p:spPr>
+        <p:style>
+          <a:lnRef idx="2">
+            <a:schemeClr val="accent1">
+              <a:shade val="15000"/>
+            </a:schemeClr>
+          </a:lnRef>
+          <a:fillRef idx="1">
+            <a:schemeClr val="accent1"/>
+          </a:fillRef>
+          <a:effectRef idx="0">
+            <a:schemeClr val="accent1"/>
+          </a:effectRef>
+          <a:fontRef idx="minor">
+            <a:schemeClr val="lt1"/>
+          </a:fontRef>
+        </p:style>
+        <p:txBody>
+          <a:bodyPr rtlCol="0" anchor="ctr"/>
+          <a:lstStyle/>
+          <a:p>
+            <a:pPr algn="ctr"/>
+            <a:r>
+              <a:rPr lang="en-US" sz="3200" dirty="0"/>
+              <a:t>More consistent ordering for split queries</a:t>
+            </a:r>
+          </a:p>
+        </p:txBody>
+      </p:sp>
+      <p:sp>
+        <p:nvSpPr>
+          <p:cNvPr id="2" name="Rectangle: Rounded Corners 1">
+            <a:extLst>
+              <a:ext uri="{FF2B5EF4-FFF2-40B4-BE49-F238E27FC236}">
+                <a16:creationId xmlns:a16="http://schemas.microsoft.com/office/drawing/2014/main" id="{9F2DC58D-18E9-8298-69D9-9096B6B80B8D}"/>
+              </a:ext>
+            </a:extLst>
+          </p:cNvPr>
+          <p:cNvSpPr/>
+          <p:nvPr/>
+        </p:nvSpPr>
+        <p:spPr>
+          <a:xfrm>
+            <a:off x="7660806" y="10692984"/>
+            <a:ext cx="8353893" cy="1409075"/>
+          </a:xfrm>
+          <a:prstGeom prst="roundRect">
+            <a:avLst/>
+          </a:prstGeom>
+          <a:solidFill>
+            <a:srgbClr val="7030A0"/>
+          </a:solidFill>
+        </p:spPr>
+        <p:style>
+          <a:lnRef idx="2">
+            <a:schemeClr val="accent1">
+              <a:shade val="15000"/>
+            </a:schemeClr>
+          </a:lnRef>
+          <a:fillRef idx="1">
+            <a:schemeClr val="accent1"/>
+          </a:fillRef>
+          <a:effectRef idx="0">
+            <a:schemeClr val="accent1"/>
+          </a:effectRef>
+          <a:fontRef idx="minor">
+            <a:schemeClr val="lt1"/>
+          </a:fontRef>
+        </p:style>
+        <p:txBody>
+          <a:bodyPr rtlCol="0" anchor="ctr"/>
+          <a:lstStyle/>
+          <a:p>
+            <a:pPr algn="ctr"/>
+            <a:r>
+              <a:rPr lang="en-US" sz="3200" dirty="0"/>
+              <a:t>Named query filters</a:t>
+            </a:r>
+            <a:endParaRPr lang="es-ES" sz="3200" dirty="0"/>
+          </a:p>
+        </p:txBody>
+      </p:sp>
+    </p:spTree>
+    <p:extLst>
+      <p:ext uri="{BB962C8B-B14F-4D97-AF65-F5344CB8AC3E}">
+        <p14:creationId xmlns:p14="http://schemas.microsoft.com/office/powerpoint/2010/main" val="249127959"/>
+      </p:ext>
+    </p:extLst>
+  </p:cSld>
+  <p:clrMapOvr>
+    <a:masterClrMapping/>
+  </p:clrMapOvr>
+</p:sld>
+</file>
+
+<file path=ppt/slides/slide6.xml><?xml version="1.0" encoding="utf-8"?>
 <p:sld xmlns:a="http://schemas.openxmlformats.org/drawingml/2006/main" xmlns:r="http://schemas.openxmlformats.org/officeDocument/2006/relationships" xmlns:p="http://schemas.openxmlformats.org/presentationml/2006/main">
   <p:cSld>
     <p:spTree>
@@ -3861,7 +4610,13 @@
           <a:p>
             <a:r>
               <a:rPr lang="en-US" b="1" dirty="0"/>
-              <a:t>New Features of C# 14</a:t>
+              <a:t>New Features of C# 14 </a:t>
+            </a:r>
+          </a:p>
+          <a:p>
+            <a:r>
+              <a:rPr lang="en-US" b="1" dirty="0"/>
+              <a:t>New Features of EF Core 10</a:t>
             </a:r>
           </a:p>
         </p:txBody>
@@ -3912,7 +4667,7 @@
 </p:sld>
 </file>
 
-<file path=ppt/slides/slide11.xml><?xml version="1.0" encoding="utf-8"?>
+<file path=ppt/slides/slide7.xml><?xml version="1.0" encoding="utf-8"?>
 <p:sld xmlns:a="http://schemas.openxmlformats.org/drawingml/2006/main" xmlns:r="http://schemas.openxmlformats.org/officeDocument/2006/relationships" xmlns:p="http://schemas.openxmlformats.org/presentationml/2006/main">
   <p:cSld>
     <p:spTree>
@@ -4117,7 +4872,7 @@
 </p:sld>
 </file>
 
-<file path=ppt/slides/slide12.xml><?xml version="1.0" encoding="utf-8"?>
+<file path=ppt/slides/slide8.xml><?xml version="1.0" encoding="utf-8"?>
 <p:sld xmlns:a="http://schemas.openxmlformats.org/drawingml/2006/main" xmlns:r="http://schemas.openxmlformats.org/officeDocument/2006/relationships" xmlns:p="http://schemas.openxmlformats.org/presentationml/2006/main">
   <p:cSld>
     <p:spTree>
@@ -4181,1230 +4936,6 @@
     <p:extLst>
       <p:ext uri="{BB962C8B-B14F-4D97-AF65-F5344CB8AC3E}">
         <p14:creationId xmlns:p14="http://schemas.microsoft.com/office/powerpoint/2010/main" val="4133806821"/>
-      </p:ext>
-    </p:extLst>
-  </p:cSld>
-  <p:clrMapOvr>
-    <a:masterClrMapping/>
-  </p:clrMapOvr>
-</p:sld>
-</file>
-
-<file path=ppt/slides/slide2.xml><?xml version="1.0" encoding="utf-8"?>
-<p:sld xmlns:a="http://schemas.openxmlformats.org/drawingml/2006/main" xmlns:r="http://schemas.openxmlformats.org/officeDocument/2006/relationships" xmlns:p="http://schemas.openxmlformats.org/presentationml/2006/main">
-  <p:cSld>
-    <p:bg>
-      <p:bgPr>
-        <a:solidFill>
-          <a:schemeClr val="accent4">
-            <a:lumMod val="25000"/>
-          </a:schemeClr>
-        </a:solidFill>
-        <a:effectLst/>
-      </p:bgPr>
-    </p:bg>
-    <p:spTree>
-      <p:nvGrpSpPr>
-        <p:cNvPr id="1" name="">
-          <a:extLst>
-            <a:ext uri="{FF2B5EF4-FFF2-40B4-BE49-F238E27FC236}">
-              <a16:creationId xmlns:a16="http://schemas.microsoft.com/office/drawing/2014/main" id="{D4D64D80-A126-C883-510E-26D4F2060F91}"/>
-            </a:ext>
-          </a:extLst>
-        </p:cNvPr>
-        <p:cNvGrpSpPr/>
-        <p:nvPr/>
-      </p:nvGrpSpPr>
-      <p:grpSpPr>
-        <a:xfrm>
-          <a:off x="0" y="0"/>
-          <a:ext cx="0" cy="0"/>
-          <a:chOff x="0" y="0"/>
-          <a:chExt cx="0" cy="0"/>
-        </a:xfrm>
-      </p:grpSpPr>
-      <p:sp>
-        <p:nvSpPr>
-          <p:cNvPr id="2" name="Text Placeholder 1">
-            <a:extLst>
-              <a:ext uri="{FF2B5EF4-FFF2-40B4-BE49-F238E27FC236}">
-                <a16:creationId xmlns:a16="http://schemas.microsoft.com/office/drawing/2014/main" id="{56BB028E-210D-C2C4-FDAC-78E1617C29BD}"/>
-              </a:ext>
-            </a:extLst>
-          </p:cNvPr>
-          <p:cNvSpPr>
-            <a:spLocks noGrp="1"/>
-          </p:cNvSpPr>
-          <p:nvPr>
-            <p:ph type="body" sz="quarter" idx="12"/>
-          </p:nvPr>
-        </p:nvSpPr>
-        <p:spPr>
-          <a:xfrm>
-            <a:off x="2757376" y="6096225"/>
-            <a:ext cx="9899845" cy="1289311"/>
-          </a:xfrm>
-        </p:spPr>
-        <p:txBody>
-          <a:bodyPr/>
-          <a:lstStyle/>
-          <a:p>
-            <a:r>
-              <a:rPr lang="en-US" b="1" dirty="0"/>
-              <a:t>New in C# 14</a:t>
-            </a:r>
-          </a:p>
-        </p:txBody>
-      </p:sp>
-      <p:sp>
-        <p:nvSpPr>
-          <p:cNvPr id="3" name="Text Placeholder 2">
-            <a:extLst>
-              <a:ext uri="{FF2B5EF4-FFF2-40B4-BE49-F238E27FC236}">
-                <a16:creationId xmlns:a16="http://schemas.microsoft.com/office/drawing/2014/main" id="{6ADA93F0-C53A-19C9-3730-F7D10E2CC2FE}"/>
-              </a:ext>
-            </a:extLst>
-          </p:cNvPr>
-          <p:cNvSpPr>
-            <a:spLocks noGrp="1"/>
-          </p:cNvSpPr>
-          <p:nvPr>
-            <p:ph type="body" sz="quarter" idx="19"/>
-          </p:nvPr>
-        </p:nvSpPr>
-        <p:spPr/>
-        <p:txBody>
-          <a:bodyPr/>
-          <a:lstStyle/>
-          <a:p>
-            <a:r>
-              <a:rPr lang="en-US" b="1">
-                <a:solidFill>
-                  <a:schemeClr val="bg2"/>
-                </a:solidFill>
-              </a:rPr>
-              <a:t>01</a:t>
-            </a:r>
-          </a:p>
-        </p:txBody>
-      </p:sp>
-    </p:spTree>
-    <p:extLst>
-      <p:ext uri="{BB962C8B-B14F-4D97-AF65-F5344CB8AC3E}">
-        <p14:creationId xmlns:p14="http://schemas.microsoft.com/office/powerpoint/2010/main" val="3285160243"/>
-      </p:ext>
-    </p:extLst>
-  </p:cSld>
-  <p:clrMapOvr>
-    <a:masterClrMapping/>
-  </p:clrMapOvr>
-</p:sld>
-</file>
-
-<file path=ppt/slides/slide3.xml><?xml version="1.0" encoding="utf-8"?>
-<p:sld xmlns:a="http://schemas.openxmlformats.org/drawingml/2006/main" xmlns:r="http://schemas.openxmlformats.org/officeDocument/2006/relationships" xmlns:p="http://schemas.openxmlformats.org/presentationml/2006/main">
-  <p:cSld>
-    <p:spTree>
-      <p:nvGrpSpPr>
-        <p:cNvPr id="1" name=""/>
-        <p:cNvGrpSpPr/>
-        <p:nvPr/>
-      </p:nvGrpSpPr>
-      <p:grpSpPr>
-        <a:xfrm>
-          <a:off x="0" y="0"/>
-          <a:ext cx="0" cy="0"/>
-          <a:chOff x="0" y="0"/>
-          <a:chExt cx="0" cy="0"/>
-        </a:xfrm>
-      </p:grpSpPr>
-      <p:sp>
-        <p:nvSpPr>
-          <p:cNvPr id="8" name="Rectangle: Rounded Corners 7">
-            <a:extLst>
-              <a:ext uri="{FF2B5EF4-FFF2-40B4-BE49-F238E27FC236}">
-                <a16:creationId xmlns:a16="http://schemas.microsoft.com/office/drawing/2014/main" id="{FAC71E6E-506D-8E06-6123-EF86F045ED06}"/>
-              </a:ext>
-            </a:extLst>
-          </p:cNvPr>
-          <p:cNvSpPr/>
-          <p:nvPr/>
-        </p:nvSpPr>
-        <p:spPr>
-          <a:xfrm>
-            <a:off x="2377607" y="2069684"/>
-            <a:ext cx="8353893" cy="1409075"/>
-          </a:xfrm>
-          <a:prstGeom prst="roundRect">
-            <a:avLst/>
-          </a:prstGeom>
-          <a:solidFill>
-            <a:srgbClr val="7030A0"/>
-          </a:solidFill>
-        </p:spPr>
-        <p:style>
-          <a:lnRef idx="2">
-            <a:schemeClr val="accent1">
-              <a:shade val="15000"/>
-            </a:schemeClr>
-          </a:lnRef>
-          <a:fillRef idx="1">
-            <a:schemeClr val="accent1"/>
-          </a:fillRef>
-          <a:effectRef idx="0">
-            <a:schemeClr val="accent1"/>
-          </a:effectRef>
-          <a:fontRef idx="minor">
-            <a:schemeClr val="lt1"/>
-          </a:fontRef>
-        </p:style>
-        <p:txBody>
-          <a:bodyPr rtlCol="0" anchor="ctr"/>
-          <a:lstStyle/>
-          <a:p>
-            <a:pPr algn="ctr"/>
-            <a:r>
-              <a:rPr lang="en-US" sz="3200" dirty="0"/>
-              <a:t>Null-conditional assignment</a:t>
-            </a:r>
-            <a:endParaRPr lang="es-ES" sz="3200" dirty="0"/>
-          </a:p>
-        </p:txBody>
-      </p:sp>
-      <p:sp>
-        <p:nvSpPr>
-          <p:cNvPr id="9" name="Rectangle: Rounded Corners 8">
-            <a:extLst>
-              <a:ext uri="{FF2B5EF4-FFF2-40B4-BE49-F238E27FC236}">
-                <a16:creationId xmlns:a16="http://schemas.microsoft.com/office/drawing/2014/main" id="{9DAEC0D6-7F18-A378-3BB7-C92DB8DE9208}"/>
-              </a:ext>
-            </a:extLst>
-          </p:cNvPr>
-          <p:cNvSpPr/>
-          <p:nvPr/>
-        </p:nvSpPr>
-        <p:spPr>
-          <a:xfrm>
-            <a:off x="12639207" y="4292184"/>
-            <a:ext cx="8353893" cy="1409075"/>
-          </a:xfrm>
-          <a:prstGeom prst="roundRect">
-            <a:avLst/>
-          </a:prstGeom>
-          <a:solidFill>
-            <a:srgbClr val="7030A0"/>
-          </a:solidFill>
-        </p:spPr>
-        <p:style>
-          <a:lnRef idx="2">
-            <a:schemeClr val="accent1">
-              <a:shade val="15000"/>
-            </a:schemeClr>
-          </a:lnRef>
-          <a:fillRef idx="1">
-            <a:schemeClr val="accent1"/>
-          </a:fillRef>
-          <a:effectRef idx="0">
-            <a:schemeClr val="accent1"/>
-          </a:effectRef>
-          <a:fontRef idx="minor">
-            <a:schemeClr val="lt1"/>
-          </a:fontRef>
-        </p:style>
-        <p:txBody>
-          <a:bodyPr rtlCol="0" anchor="ctr"/>
-          <a:lstStyle/>
-          <a:p>
-            <a:pPr algn="ctr"/>
-            <a:r>
-              <a:rPr lang="en-US" sz="3200" dirty="0"/>
-              <a:t>User-defined compound assignment operators</a:t>
-            </a:r>
-            <a:endParaRPr lang="es-ES" sz="3200" dirty="0"/>
-          </a:p>
-        </p:txBody>
-      </p:sp>
-      <p:sp>
-        <p:nvSpPr>
-          <p:cNvPr id="10" name="Rectangle: Rounded Corners 9">
-            <a:extLst>
-              <a:ext uri="{FF2B5EF4-FFF2-40B4-BE49-F238E27FC236}">
-                <a16:creationId xmlns:a16="http://schemas.microsoft.com/office/drawing/2014/main" id="{D6C6662E-5AD3-2664-199D-FFD5FA545125}"/>
-              </a:ext>
-            </a:extLst>
-          </p:cNvPr>
-          <p:cNvSpPr/>
-          <p:nvPr/>
-        </p:nvSpPr>
-        <p:spPr>
-          <a:xfrm>
-            <a:off x="2377606" y="4292184"/>
-            <a:ext cx="8353893" cy="1409075"/>
-          </a:xfrm>
-          <a:prstGeom prst="roundRect">
-            <a:avLst/>
-          </a:prstGeom>
-          <a:solidFill>
-            <a:srgbClr val="7030A0"/>
-          </a:solidFill>
-        </p:spPr>
-        <p:style>
-          <a:lnRef idx="2">
-            <a:schemeClr val="accent1">
-              <a:shade val="15000"/>
-            </a:schemeClr>
-          </a:lnRef>
-          <a:fillRef idx="1">
-            <a:schemeClr val="accent1"/>
-          </a:fillRef>
-          <a:effectRef idx="0">
-            <a:schemeClr val="accent1"/>
-          </a:effectRef>
-          <a:fontRef idx="minor">
-            <a:schemeClr val="lt1"/>
-          </a:fontRef>
-        </p:style>
-        <p:txBody>
-          <a:bodyPr rtlCol="0" anchor="ctr"/>
-          <a:lstStyle/>
-          <a:p>
-            <a:pPr algn="ctr"/>
-            <a:r>
-              <a:rPr lang="en-US" sz="3200" dirty="0"/>
-              <a:t>Partial events and constructors</a:t>
-            </a:r>
-            <a:endParaRPr lang="es-ES" sz="3200" dirty="0"/>
-          </a:p>
-        </p:txBody>
-      </p:sp>
-      <p:sp>
-        <p:nvSpPr>
-          <p:cNvPr id="11" name="Rectangle: Rounded Corners 10">
-            <a:extLst>
-              <a:ext uri="{FF2B5EF4-FFF2-40B4-BE49-F238E27FC236}">
-                <a16:creationId xmlns:a16="http://schemas.microsoft.com/office/drawing/2014/main" id="{27A0ED8B-01A7-E318-0DAF-8A427194AB6C}"/>
-              </a:ext>
-            </a:extLst>
-          </p:cNvPr>
-          <p:cNvSpPr/>
-          <p:nvPr/>
-        </p:nvSpPr>
-        <p:spPr>
-          <a:xfrm>
-            <a:off x="12639207" y="2069684"/>
-            <a:ext cx="8353893" cy="1409075"/>
-          </a:xfrm>
-          <a:prstGeom prst="roundRect">
-            <a:avLst/>
-          </a:prstGeom>
-          <a:solidFill>
-            <a:srgbClr val="7030A0"/>
-          </a:solidFill>
-        </p:spPr>
-        <p:style>
-          <a:lnRef idx="2">
-            <a:schemeClr val="accent1">
-              <a:shade val="15000"/>
-            </a:schemeClr>
-          </a:lnRef>
-          <a:fillRef idx="1">
-            <a:schemeClr val="accent1"/>
-          </a:fillRef>
-          <a:effectRef idx="0">
-            <a:schemeClr val="accent1"/>
-          </a:effectRef>
-          <a:fontRef idx="minor">
-            <a:schemeClr val="lt1"/>
-          </a:fontRef>
-        </p:style>
-        <p:txBody>
-          <a:bodyPr rtlCol="0" anchor="ctr"/>
-          <a:lstStyle/>
-          <a:p>
-            <a:pPr algn="ctr"/>
-            <a:r>
-              <a:rPr lang="en-US" sz="3200" dirty="0"/>
-              <a:t>Field access in auto-properties</a:t>
-            </a:r>
-            <a:endParaRPr lang="es-ES" sz="3200" dirty="0"/>
-          </a:p>
-        </p:txBody>
-      </p:sp>
-      <p:sp>
-        <p:nvSpPr>
-          <p:cNvPr id="12" name="Rectangle: Rounded Corners 11">
-            <a:extLst>
-              <a:ext uri="{FF2B5EF4-FFF2-40B4-BE49-F238E27FC236}">
-                <a16:creationId xmlns:a16="http://schemas.microsoft.com/office/drawing/2014/main" id="{20E357C3-B200-B56C-9E45-245B05127D78}"/>
-              </a:ext>
-            </a:extLst>
-          </p:cNvPr>
-          <p:cNvSpPr/>
-          <p:nvPr/>
-        </p:nvSpPr>
-        <p:spPr>
-          <a:xfrm>
-            <a:off x="2377606" y="6514684"/>
-            <a:ext cx="8353893" cy="1409075"/>
-          </a:xfrm>
-          <a:prstGeom prst="roundRect">
-            <a:avLst/>
-          </a:prstGeom>
-          <a:solidFill>
-            <a:srgbClr val="7030A0"/>
-          </a:solidFill>
-        </p:spPr>
-        <p:style>
-          <a:lnRef idx="2">
-            <a:schemeClr val="accent1">
-              <a:shade val="15000"/>
-            </a:schemeClr>
-          </a:lnRef>
-          <a:fillRef idx="1">
-            <a:schemeClr val="accent1"/>
-          </a:fillRef>
-          <a:effectRef idx="0">
-            <a:schemeClr val="accent1"/>
-          </a:effectRef>
-          <a:fontRef idx="minor">
-            <a:schemeClr val="lt1"/>
-          </a:fontRef>
-        </p:style>
-        <p:txBody>
-          <a:bodyPr rtlCol="0" anchor="ctr"/>
-          <a:lstStyle/>
-          <a:p>
-            <a:pPr algn="ctr"/>
-            <a:r>
-              <a:rPr lang="en-US" sz="3200" dirty="0"/>
-              <a:t>Extension members</a:t>
-            </a:r>
-            <a:endParaRPr lang="es-ES" sz="3200" dirty="0"/>
-          </a:p>
-        </p:txBody>
-      </p:sp>
-      <p:sp>
-        <p:nvSpPr>
-          <p:cNvPr id="13" name="Rectangle: Rounded Corners 12">
-            <a:extLst>
-              <a:ext uri="{FF2B5EF4-FFF2-40B4-BE49-F238E27FC236}">
-                <a16:creationId xmlns:a16="http://schemas.microsoft.com/office/drawing/2014/main" id="{A38E6E29-A359-4DDF-7728-0E50FAC8F8B6}"/>
-              </a:ext>
-            </a:extLst>
-          </p:cNvPr>
-          <p:cNvSpPr/>
-          <p:nvPr/>
-        </p:nvSpPr>
-        <p:spPr>
-          <a:xfrm>
-            <a:off x="12639205" y="6514684"/>
-            <a:ext cx="8353893" cy="1409075"/>
-          </a:xfrm>
-          <a:prstGeom prst="roundRect">
-            <a:avLst/>
-          </a:prstGeom>
-          <a:solidFill>
-            <a:srgbClr val="7030A0"/>
-          </a:solidFill>
-        </p:spPr>
-        <p:style>
-          <a:lnRef idx="2">
-            <a:schemeClr val="accent1">
-              <a:shade val="15000"/>
-            </a:schemeClr>
-          </a:lnRef>
-          <a:fillRef idx="1">
-            <a:schemeClr val="accent1"/>
-          </a:fillRef>
-          <a:effectRef idx="0">
-            <a:schemeClr val="accent1"/>
-          </a:effectRef>
-          <a:fontRef idx="minor">
-            <a:schemeClr val="lt1"/>
-          </a:fontRef>
-        </p:style>
-        <p:txBody>
-          <a:bodyPr rtlCol="0" anchor="ctr"/>
-          <a:lstStyle/>
-          <a:p>
-            <a:pPr algn="ctr"/>
-            <a:r>
-              <a:rPr lang="en-US" sz="3200" dirty="0"/>
-              <a:t>Extension operators</a:t>
-            </a:r>
-            <a:endParaRPr lang="es-ES" sz="3200" dirty="0"/>
-          </a:p>
-        </p:txBody>
-      </p:sp>
-      <p:sp>
-        <p:nvSpPr>
-          <p:cNvPr id="14" name="Rectangle: Rounded Corners 13">
-            <a:extLst>
-              <a:ext uri="{FF2B5EF4-FFF2-40B4-BE49-F238E27FC236}">
-                <a16:creationId xmlns:a16="http://schemas.microsoft.com/office/drawing/2014/main" id="{9DB4C7B9-A3FA-65A6-1866-FF870C70347C}"/>
-              </a:ext>
-            </a:extLst>
-          </p:cNvPr>
-          <p:cNvSpPr/>
-          <p:nvPr/>
-        </p:nvSpPr>
-        <p:spPr>
-          <a:xfrm>
-            <a:off x="2377605" y="8648284"/>
-            <a:ext cx="8353893" cy="1409075"/>
-          </a:xfrm>
-          <a:prstGeom prst="roundRect">
-            <a:avLst/>
-          </a:prstGeom>
-          <a:solidFill>
-            <a:srgbClr val="7030A0"/>
-          </a:solidFill>
-        </p:spPr>
-        <p:style>
-          <a:lnRef idx="2">
-            <a:schemeClr val="accent1">
-              <a:shade val="15000"/>
-            </a:schemeClr>
-          </a:lnRef>
-          <a:fillRef idx="1">
-            <a:schemeClr val="accent1"/>
-          </a:fillRef>
-          <a:effectRef idx="0">
-            <a:schemeClr val="accent1"/>
-          </a:effectRef>
-          <a:fontRef idx="minor">
-            <a:schemeClr val="lt1"/>
-          </a:fontRef>
-        </p:style>
-        <p:txBody>
-          <a:bodyPr rtlCol="0" anchor="ctr"/>
-          <a:lstStyle/>
-          <a:p>
-            <a:pPr algn="ctr"/>
-            <a:r>
-              <a:rPr lang="en-US" sz="3200" dirty="0"/>
-              <a:t>Unbound generic types in “</a:t>
-            </a:r>
-            <a:r>
-              <a:rPr lang="en-US" sz="3200" dirty="0" err="1"/>
-              <a:t>nameof</a:t>
-            </a:r>
-            <a:r>
-              <a:rPr lang="en-US" sz="3200" dirty="0"/>
-              <a:t>()”</a:t>
-            </a:r>
-            <a:endParaRPr lang="es-ES" sz="3200" dirty="0"/>
-          </a:p>
-        </p:txBody>
-      </p:sp>
-      <p:sp>
-        <p:nvSpPr>
-          <p:cNvPr id="15" name="Rectangle: Rounded Corners 14">
-            <a:extLst>
-              <a:ext uri="{FF2B5EF4-FFF2-40B4-BE49-F238E27FC236}">
-                <a16:creationId xmlns:a16="http://schemas.microsoft.com/office/drawing/2014/main" id="{C56AB685-A61C-2909-4324-E34BA63EABE3}"/>
-              </a:ext>
-            </a:extLst>
-          </p:cNvPr>
-          <p:cNvSpPr/>
-          <p:nvPr/>
-        </p:nvSpPr>
-        <p:spPr>
-          <a:xfrm>
-            <a:off x="12639206" y="8648284"/>
-            <a:ext cx="8353893" cy="1409075"/>
-          </a:xfrm>
-          <a:prstGeom prst="roundRect">
-            <a:avLst/>
-          </a:prstGeom>
-          <a:solidFill>
-            <a:srgbClr val="7030A0"/>
-          </a:solidFill>
-        </p:spPr>
-        <p:style>
-          <a:lnRef idx="2">
-            <a:schemeClr val="accent1">
-              <a:shade val="15000"/>
-            </a:schemeClr>
-          </a:lnRef>
-          <a:fillRef idx="1">
-            <a:schemeClr val="accent1"/>
-          </a:fillRef>
-          <a:effectRef idx="0">
-            <a:schemeClr val="accent1"/>
-          </a:effectRef>
-          <a:fontRef idx="minor">
-            <a:schemeClr val="lt1"/>
-          </a:fontRef>
-        </p:style>
-        <p:txBody>
-          <a:bodyPr rtlCol="0" anchor="ctr"/>
-          <a:lstStyle/>
-          <a:p>
-            <a:pPr algn="ctr"/>
-            <a:r>
-              <a:rPr lang="en-US" sz="3200" dirty="0"/>
-              <a:t>Simple lambda parameters with modifiers</a:t>
-            </a:r>
-            <a:endParaRPr lang="es-ES" sz="3200" dirty="0"/>
-          </a:p>
-        </p:txBody>
-      </p:sp>
-    </p:spTree>
-    <p:extLst>
-      <p:ext uri="{BB962C8B-B14F-4D97-AF65-F5344CB8AC3E}">
-        <p14:creationId xmlns:p14="http://schemas.microsoft.com/office/powerpoint/2010/main" val="2764486210"/>
-      </p:ext>
-    </p:extLst>
-  </p:cSld>
-  <p:clrMapOvr>
-    <a:masterClrMapping/>
-  </p:clrMapOvr>
-</p:sld>
-</file>
-
-<file path=ppt/slides/slide4.xml><?xml version="1.0" encoding="utf-8"?>
-<p:sld xmlns:a="http://schemas.openxmlformats.org/drawingml/2006/main" xmlns:r="http://schemas.openxmlformats.org/officeDocument/2006/relationships" xmlns:p="http://schemas.openxmlformats.org/presentationml/2006/main">
-  <p:cSld>
-    <p:bg>
-      <p:bgPr>
-        <a:solidFill>
-          <a:schemeClr val="accent4">
-            <a:lumMod val="25000"/>
-          </a:schemeClr>
-        </a:solidFill>
-        <a:effectLst/>
-      </p:bgPr>
-    </p:bg>
-    <p:spTree>
-      <p:nvGrpSpPr>
-        <p:cNvPr id="1" name="">
-          <a:extLst>
-            <a:ext uri="{FF2B5EF4-FFF2-40B4-BE49-F238E27FC236}">
-              <a16:creationId xmlns:a16="http://schemas.microsoft.com/office/drawing/2014/main" id="{93EB95C8-0BA6-9F1F-3439-59264533682C}"/>
-            </a:ext>
-          </a:extLst>
-        </p:cNvPr>
-        <p:cNvGrpSpPr/>
-        <p:nvPr/>
-      </p:nvGrpSpPr>
-      <p:grpSpPr>
-        <a:xfrm>
-          <a:off x="0" y="0"/>
-          <a:ext cx="0" cy="0"/>
-          <a:chOff x="0" y="0"/>
-          <a:chExt cx="0" cy="0"/>
-        </a:xfrm>
-      </p:grpSpPr>
-      <p:sp>
-        <p:nvSpPr>
-          <p:cNvPr id="2" name="Text Placeholder 1">
-            <a:extLst>
-              <a:ext uri="{FF2B5EF4-FFF2-40B4-BE49-F238E27FC236}">
-                <a16:creationId xmlns:a16="http://schemas.microsoft.com/office/drawing/2014/main" id="{4C90D896-23B7-D850-DFE2-D532153132D2}"/>
-              </a:ext>
-            </a:extLst>
-          </p:cNvPr>
-          <p:cNvSpPr>
-            <a:spLocks noGrp="1"/>
-          </p:cNvSpPr>
-          <p:nvPr>
-            <p:ph type="body" sz="quarter" idx="12"/>
-          </p:nvPr>
-        </p:nvSpPr>
-        <p:spPr>
-          <a:xfrm>
-            <a:off x="2757376" y="6096225"/>
-            <a:ext cx="11784124" cy="1289311"/>
-          </a:xfrm>
-        </p:spPr>
-        <p:txBody>
-          <a:bodyPr/>
-          <a:lstStyle/>
-          <a:p>
-            <a:r>
-              <a:rPr lang="en-US" b="1" dirty="0"/>
-              <a:t>New in EF Core 10</a:t>
-            </a:r>
-          </a:p>
-        </p:txBody>
-      </p:sp>
-      <p:sp>
-        <p:nvSpPr>
-          <p:cNvPr id="3" name="Text Placeholder 2">
-            <a:extLst>
-              <a:ext uri="{FF2B5EF4-FFF2-40B4-BE49-F238E27FC236}">
-                <a16:creationId xmlns:a16="http://schemas.microsoft.com/office/drawing/2014/main" id="{EEB0A1D8-D729-BE40-2C85-395EBF26C1D5}"/>
-              </a:ext>
-            </a:extLst>
-          </p:cNvPr>
-          <p:cNvSpPr>
-            <a:spLocks noGrp="1"/>
-          </p:cNvSpPr>
-          <p:nvPr>
-            <p:ph type="body" sz="quarter" idx="19"/>
-          </p:nvPr>
-        </p:nvSpPr>
-        <p:spPr>
-          <a:xfrm>
-            <a:off x="1039104" y="6096226"/>
-            <a:ext cx="1718271" cy="1289312"/>
-          </a:xfrm>
-        </p:spPr>
-        <p:txBody>
-          <a:bodyPr/>
-          <a:lstStyle/>
-          <a:p>
-            <a:r>
-              <a:rPr lang="en-US" b="1" dirty="0">
-                <a:solidFill>
-                  <a:schemeClr val="bg2"/>
-                </a:solidFill>
-              </a:rPr>
-              <a:t>02</a:t>
-            </a:r>
-          </a:p>
-        </p:txBody>
-      </p:sp>
-    </p:spTree>
-    <p:extLst>
-      <p:ext uri="{BB962C8B-B14F-4D97-AF65-F5344CB8AC3E}">
-        <p14:creationId xmlns:p14="http://schemas.microsoft.com/office/powerpoint/2010/main" val="3166214339"/>
-      </p:ext>
-    </p:extLst>
-  </p:cSld>
-  <p:clrMapOvr>
-    <a:masterClrMapping/>
-  </p:clrMapOvr>
-</p:sld>
-</file>
-
-<file path=ppt/slides/slide5.xml><?xml version="1.0" encoding="utf-8"?>
-<p:sld xmlns:a="http://schemas.openxmlformats.org/drawingml/2006/main" xmlns:r="http://schemas.openxmlformats.org/officeDocument/2006/relationships" xmlns:p="http://schemas.openxmlformats.org/presentationml/2006/main">
-  <p:cSld>
-    <p:spTree>
-      <p:nvGrpSpPr>
-        <p:cNvPr id="1" name="">
-          <a:extLst>
-            <a:ext uri="{FF2B5EF4-FFF2-40B4-BE49-F238E27FC236}">
-              <a16:creationId xmlns:a16="http://schemas.microsoft.com/office/drawing/2014/main" id="{FC64EE29-8D31-496C-9603-EB9C2AD432CE}"/>
-            </a:ext>
-          </a:extLst>
-        </p:cNvPr>
-        <p:cNvGrpSpPr/>
-        <p:nvPr/>
-      </p:nvGrpSpPr>
-      <p:grpSpPr>
-        <a:xfrm>
-          <a:off x="0" y="0"/>
-          <a:ext cx="0" cy="0"/>
-          <a:chOff x="0" y="0"/>
-          <a:chExt cx="0" cy="0"/>
-        </a:xfrm>
-      </p:grpSpPr>
-      <p:sp>
-        <p:nvSpPr>
-          <p:cNvPr id="9" name="Title 8">
-            <a:extLst>
-              <a:ext uri="{FF2B5EF4-FFF2-40B4-BE49-F238E27FC236}">
-                <a16:creationId xmlns:a16="http://schemas.microsoft.com/office/drawing/2014/main" id="{D30807AD-B867-9CA4-D3BA-C9DCE20EFD97}"/>
-              </a:ext>
-            </a:extLst>
-          </p:cNvPr>
-          <p:cNvSpPr>
-            <a:spLocks noGrp="1"/>
-          </p:cNvSpPr>
-          <p:nvPr>
-            <p:ph type="title"/>
-          </p:nvPr>
-        </p:nvSpPr>
-        <p:spPr/>
-        <p:txBody>
-          <a:bodyPr/>
-          <a:lstStyle/>
-          <a:p>
-            <a:r>
-              <a:rPr lang="en-US" dirty="0"/>
-              <a:t>🚀Targeted performance improvements</a:t>
-            </a:r>
-          </a:p>
-        </p:txBody>
-      </p:sp>
-      <p:sp>
-        <p:nvSpPr>
-          <p:cNvPr id="10" name="Content Placeholder 9">
-            <a:extLst>
-              <a:ext uri="{FF2B5EF4-FFF2-40B4-BE49-F238E27FC236}">
-                <a16:creationId xmlns:a16="http://schemas.microsoft.com/office/drawing/2014/main" id="{AAF14E8A-6EB0-2BE6-D6DA-C90AAE9A4E7B}"/>
-              </a:ext>
-            </a:extLst>
-          </p:cNvPr>
-          <p:cNvSpPr>
-            <a:spLocks noGrp="1"/>
-          </p:cNvSpPr>
-          <p:nvPr>
-            <p:ph idx="1"/>
-          </p:nvPr>
-        </p:nvSpPr>
-        <p:spPr/>
-        <p:txBody>
-          <a:bodyPr>
-            <a:normAutofit/>
-          </a:bodyPr>
-          <a:lstStyle/>
-          <a:p>
-            <a:r>
-              <a:rPr lang="en-US" dirty="0"/>
-              <a:t>Releasing memory from Kestrel memory pool</a:t>
-            </a:r>
-          </a:p>
-          <a:p>
-            <a:r>
-              <a:rPr lang="en-US" dirty="0">
-                <a:ea typeface="+mn-lt"/>
-                <a:cs typeface="+mn-lt"/>
-              </a:rPr>
-              <a:t>API JSON deserialization performance</a:t>
-            </a:r>
-          </a:p>
-        </p:txBody>
-      </p:sp>
-    </p:spTree>
-    <p:extLst>
-      <p:ext uri="{BB962C8B-B14F-4D97-AF65-F5344CB8AC3E}">
-        <p14:creationId xmlns:p14="http://schemas.microsoft.com/office/powerpoint/2010/main" val="2342601915"/>
-      </p:ext>
-    </p:extLst>
-  </p:cSld>
-  <p:clrMapOvr>
-    <a:masterClrMapping/>
-  </p:clrMapOvr>
-</p:sld>
-</file>
-
-<file path=ppt/slides/slide6.xml><?xml version="1.0" encoding="utf-8"?>
-<p:sld xmlns:a="http://schemas.openxmlformats.org/drawingml/2006/main" xmlns:r="http://schemas.openxmlformats.org/officeDocument/2006/relationships" xmlns:p="http://schemas.openxmlformats.org/presentationml/2006/main">
-  <p:cSld>
-    <p:bg>
-      <p:bgPr>
-        <a:solidFill>
-          <a:schemeClr val="accent4">
-            <a:lumMod val="25000"/>
-          </a:schemeClr>
-        </a:solidFill>
-        <a:effectLst/>
-      </p:bgPr>
-    </p:bg>
-    <p:spTree>
-      <p:nvGrpSpPr>
-        <p:cNvPr id="1" name=""/>
-        <p:cNvGrpSpPr/>
-        <p:nvPr/>
-      </p:nvGrpSpPr>
-      <p:grpSpPr>
-        <a:xfrm>
-          <a:off x="0" y="0"/>
-          <a:ext cx="0" cy="0"/>
-          <a:chOff x="0" y="0"/>
-          <a:chExt cx="0" cy="0"/>
-        </a:xfrm>
-      </p:grpSpPr>
-      <p:sp>
-        <p:nvSpPr>
-          <p:cNvPr id="2" name="Text Placeholder 1">
-            <a:extLst>
-              <a:ext uri="{FF2B5EF4-FFF2-40B4-BE49-F238E27FC236}">
-                <a16:creationId xmlns:a16="http://schemas.microsoft.com/office/drawing/2014/main" id="{8FA3DF48-5B76-8C82-FC6D-F08E08D14C76}"/>
-              </a:ext>
-            </a:extLst>
-          </p:cNvPr>
-          <p:cNvSpPr>
-            <a:spLocks noGrp="1"/>
-          </p:cNvSpPr>
-          <p:nvPr>
-            <p:ph type="body" sz="quarter" idx="12"/>
-          </p:nvPr>
-        </p:nvSpPr>
-        <p:spPr>
-          <a:xfrm>
-            <a:off x="2757376" y="6096225"/>
-            <a:ext cx="15390924" cy="1289311"/>
-          </a:xfrm>
-        </p:spPr>
-        <p:txBody>
-          <a:bodyPr/>
-          <a:lstStyle/>
-          <a:p>
-            <a:r>
-              <a:rPr lang="en-US" b="1" dirty="0"/>
-              <a:t>New in ASP.NET Core 10</a:t>
-            </a:r>
-          </a:p>
-        </p:txBody>
-      </p:sp>
-      <p:sp>
-        <p:nvSpPr>
-          <p:cNvPr id="3" name="Text Placeholder 2">
-            <a:extLst>
-              <a:ext uri="{FF2B5EF4-FFF2-40B4-BE49-F238E27FC236}">
-                <a16:creationId xmlns:a16="http://schemas.microsoft.com/office/drawing/2014/main" id="{4D7B1CB7-605A-30B6-E0E5-9EADF23702BB}"/>
-              </a:ext>
-            </a:extLst>
-          </p:cNvPr>
-          <p:cNvSpPr>
-            <a:spLocks noGrp="1"/>
-          </p:cNvSpPr>
-          <p:nvPr>
-            <p:ph type="body" sz="quarter" idx="19"/>
-          </p:nvPr>
-        </p:nvSpPr>
-        <p:spPr>
-          <a:xfrm>
-            <a:off x="842212" y="6096226"/>
-            <a:ext cx="1915164" cy="1289312"/>
-          </a:xfrm>
-        </p:spPr>
-        <p:txBody>
-          <a:bodyPr/>
-          <a:lstStyle/>
-          <a:p>
-            <a:r>
-              <a:rPr lang="en-US" b="1" dirty="0">
-                <a:solidFill>
-                  <a:schemeClr val="bg2"/>
-                </a:solidFill>
-              </a:rPr>
-              <a:t>04</a:t>
-            </a:r>
-          </a:p>
-        </p:txBody>
-      </p:sp>
-    </p:spTree>
-    <p:extLst>
-      <p:ext uri="{BB962C8B-B14F-4D97-AF65-F5344CB8AC3E}">
-        <p14:creationId xmlns:p14="http://schemas.microsoft.com/office/powerpoint/2010/main" val="1805665307"/>
-      </p:ext>
-    </p:extLst>
-  </p:cSld>
-  <p:clrMapOvr>
-    <a:masterClrMapping/>
-  </p:clrMapOvr>
-</p:sld>
-</file>
-
-<file path=ppt/slides/slide7.xml><?xml version="1.0" encoding="utf-8"?>
-<p:sld xmlns:a="http://schemas.openxmlformats.org/drawingml/2006/main" xmlns:r="http://schemas.openxmlformats.org/officeDocument/2006/relationships" xmlns:p="http://schemas.openxmlformats.org/presentationml/2006/main">
-  <p:cSld>
-    <p:spTree>
-      <p:nvGrpSpPr>
-        <p:cNvPr id="1" name="">
-          <a:extLst>
-            <a:ext uri="{FF2B5EF4-FFF2-40B4-BE49-F238E27FC236}">
-              <a16:creationId xmlns:a16="http://schemas.microsoft.com/office/drawing/2014/main" id="{3D5ADCAC-77C1-0F47-ECB8-8A43C2781E96}"/>
-            </a:ext>
-          </a:extLst>
-        </p:cNvPr>
-        <p:cNvGrpSpPr/>
-        <p:nvPr/>
-      </p:nvGrpSpPr>
-      <p:grpSpPr>
-        <a:xfrm>
-          <a:off x="0" y="0"/>
-          <a:ext cx="0" cy="0"/>
-          <a:chOff x="0" y="0"/>
-          <a:chExt cx="0" cy="0"/>
-        </a:xfrm>
-      </p:grpSpPr>
-      <p:sp>
-        <p:nvSpPr>
-          <p:cNvPr id="9" name="Title 8">
-            <a:extLst>
-              <a:ext uri="{FF2B5EF4-FFF2-40B4-BE49-F238E27FC236}">
-                <a16:creationId xmlns:a16="http://schemas.microsoft.com/office/drawing/2014/main" id="{2DE773C2-75E5-CE6C-810C-2E8477BCE9F1}"/>
-              </a:ext>
-            </a:extLst>
-          </p:cNvPr>
-          <p:cNvSpPr>
-            <a:spLocks noGrp="1"/>
-          </p:cNvSpPr>
-          <p:nvPr>
-            <p:ph type="title"/>
-          </p:nvPr>
-        </p:nvSpPr>
-        <p:spPr/>
-        <p:txBody>
-          <a:bodyPr/>
-          <a:lstStyle/>
-          <a:p>
-            <a:r>
-              <a:rPr lang="en-US"/>
-              <a:t>🚀Targeted performance improvements</a:t>
-            </a:r>
-          </a:p>
-        </p:txBody>
-      </p:sp>
-      <p:sp>
-        <p:nvSpPr>
-          <p:cNvPr id="10" name="Content Placeholder 9">
-            <a:extLst>
-              <a:ext uri="{FF2B5EF4-FFF2-40B4-BE49-F238E27FC236}">
-                <a16:creationId xmlns:a16="http://schemas.microsoft.com/office/drawing/2014/main" id="{E32D85EC-51B5-68F5-FAF8-3F6BBEF6916E}"/>
-              </a:ext>
-            </a:extLst>
-          </p:cNvPr>
-          <p:cNvSpPr>
-            <a:spLocks noGrp="1"/>
-          </p:cNvSpPr>
-          <p:nvPr>
-            <p:ph idx="1"/>
-          </p:nvPr>
-        </p:nvSpPr>
-        <p:spPr/>
-        <p:txBody>
-          <a:bodyPr>
-            <a:normAutofit/>
-          </a:bodyPr>
-          <a:lstStyle/>
-          <a:p>
-            <a:r>
-              <a:rPr lang="en-US" dirty="0"/>
-              <a:t>Releasing memory from Kestrel memory pool</a:t>
-            </a:r>
-          </a:p>
-          <a:p>
-            <a:r>
-              <a:rPr lang="en-US" dirty="0">
-                <a:ea typeface="+mn-lt"/>
-                <a:cs typeface="+mn-lt"/>
-              </a:rPr>
-              <a:t>API JSON deserialization performance</a:t>
-            </a:r>
-          </a:p>
-        </p:txBody>
-      </p:sp>
-    </p:spTree>
-    <p:extLst>
-      <p:ext uri="{BB962C8B-B14F-4D97-AF65-F5344CB8AC3E}">
-        <p14:creationId xmlns:p14="http://schemas.microsoft.com/office/powerpoint/2010/main" val="3694853036"/>
-      </p:ext>
-    </p:extLst>
-  </p:cSld>
-  <p:clrMapOvr>
-    <a:masterClrMapping/>
-  </p:clrMapOvr>
-</p:sld>
-</file>
-
-<file path=ppt/slides/slide8.xml><?xml version="1.0" encoding="utf-8"?>
-<p:sld xmlns:a="http://schemas.openxmlformats.org/drawingml/2006/main" xmlns:r="http://schemas.openxmlformats.org/officeDocument/2006/relationships" xmlns:p="http://schemas.openxmlformats.org/presentationml/2006/main">
-  <p:cSld>
-    <p:bg>
-      <p:bgPr>
-        <a:solidFill>
-          <a:schemeClr val="accent4">
-            <a:lumMod val="25000"/>
-          </a:schemeClr>
-        </a:solidFill>
-        <a:effectLst/>
-      </p:bgPr>
-    </p:bg>
-    <p:spTree>
-      <p:nvGrpSpPr>
-        <p:cNvPr id="1" name="">
-          <a:extLst>
-            <a:ext uri="{FF2B5EF4-FFF2-40B4-BE49-F238E27FC236}">
-              <a16:creationId xmlns:a16="http://schemas.microsoft.com/office/drawing/2014/main" id="{A439931B-C83D-BE77-B36F-E06D6EB1B3C6}"/>
-            </a:ext>
-          </a:extLst>
-        </p:cNvPr>
-        <p:cNvGrpSpPr/>
-        <p:nvPr/>
-      </p:nvGrpSpPr>
-      <p:grpSpPr>
-        <a:xfrm>
-          <a:off x="0" y="0"/>
-          <a:ext cx="0" cy="0"/>
-          <a:chOff x="0" y="0"/>
-          <a:chExt cx="0" cy="0"/>
-        </a:xfrm>
-      </p:grpSpPr>
-      <p:sp>
-        <p:nvSpPr>
-          <p:cNvPr id="2" name="Text Placeholder 1">
-            <a:extLst>
-              <a:ext uri="{FF2B5EF4-FFF2-40B4-BE49-F238E27FC236}">
-                <a16:creationId xmlns:a16="http://schemas.microsoft.com/office/drawing/2014/main" id="{7643CB89-1198-D624-9C0C-31A74696D5A6}"/>
-              </a:ext>
-            </a:extLst>
-          </p:cNvPr>
-          <p:cNvSpPr>
-            <a:spLocks noGrp="1"/>
-          </p:cNvSpPr>
-          <p:nvPr>
-            <p:ph type="body" sz="quarter" idx="12"/>
-          </p:nvPr>
-        </p:nvSpPr>
-        <p:spPr>
-          <a:xfrm>
-            <a:off x="2757376" y="6096225"/>
-            <a:ext cx="15390924" cy="1289311"/>
-          </a:xfrm>
-        </p:spPr>
-        <p:txBody>
-          <a:bodyPr/>
-          <a:lstStyle/>
-          <a:p>
-            <a:r>
-              <a:rPr lang="en-US" b="1" dirty="0"/>
-              <a:t>New in Aspire 13</a:t>
-            </a:r>
-          </a:p>
-        </p:txBody>
-      </p:sp>
-      <p:sp>
-        <p:nvSpPr>
-          <p:cNvPr id="3" name="Text Placeholder 2">
-            <a:extLst>
-              <a:ext uri="{FF2B5EF4-FFF2-40B4-BE49-F238E27FC236}">
-                <a16:creationId xmlns:a16="http://schemas.microsoft.com/office/drawing/2014/main" id="{FD786F0F-A357-0ED4-3FBE-2533DBCA0EA5}"/>
-              </a:ext>
-            </a:extLst>
-          </p:cNvPr>
-          <p:cNvSpPr>
-            <a:spLocks noGrp="1"/>
-          </p:cNvSpPr>
-          <p:nvPr>
-            <p:ph type="body" sz="quarter" idx="19"/>
-          </p:nvPr>
-        </p:nvSpPr>
-        <p:spPr>
-          <a:xfrm>
-            <a:off x="842212" y="6096226"/>
-            <a:ext cx="1915164" cy="1289312"/>
-          </a:xfrm>
-        </p:spPr>
-        <p:txBody>
-          <a:bodyPr/>
-          <a:lstStyle/>
-          <a:p>
-            <a:r>
-              <a:rPr lang="en-US" b="1" dirty="0">
-                <a:solidFill>
-                  <a:schemeClr val="bg2"/>
-                </a:solidFill>
-              </a:rPr>
-              <a:t>03</a:t>
-            </a:r>
-          </a:p>
-        </p:txBody>
-      </p:sp>
-    </p:spTree>
-    <p:extLst>
-      <p:ext uri="{BB962C8B-B14F-4D97-AF65-F5344CB8AC3E}">
-        <p14:creationId xmlns:p14="http://schemas.microsoft.com/office/powerpoint/2010/main" val="978254636"/>
-      </p:ext>
-    </p:extLst>
-  </p:cSld>
-  <p:clrMapOvr>
-    <a:masterClrMapping/>
-  </p:clrMapOvr>
-</p:sld>
-</file>
-
-<file path=ppt/slides/slide9.xml><?xml version="1.0" encoding="utf-8"?>
-<p:sld xmlns:a="http://schemas.openxmlformats.org/drawingml/2006/main" xmlns:r="http://schemas.openxmlformats.org/officeDocument/2006/relationships" xmlns:p="http://schemas.openxmlformats.org/presentationml/2006/main">
-  <p:cSld>
-    <p:spTree>
-      <p:nvGrpSpPr>
-        <p:cNvPr id="1" name="">
-          <a:extLst>
-            <a:ext uri="{FF2B5EF4-FFF2-40B4-BE49-F238E27FC236}">
-              <a16:creationId xmlns:a16="http://schemas.microsoft.com/office/drawing/2014/main" id="{280CF212-D7F0-C008-33C2-DCE9D4501B30}"/>
-            </a:ext>
-          </a:extLst>
-        </p:cNvPr>
-        <p:cNvGrpSpPr/>
-        <p:nvPr/>
-      </p:nvGrpSpPr>
-      <p:grpSpPr>
-        <a:xfrm>
-          <a:off x="0" y="0"/>
-          <a:ext cx="0" cy="0"/>
-          <a:chOff x="0" y="0"/>
-          <a:chExt cx="0" cy="0"/>
-        </a:xfrm>
-      </p:grpSpPr>
-      <p:sp>
-        <p:nvSpPr>
-          <p:cNvPr id="9" name="Title 8">
-            <a:extLst>
-              <a:ext uri="{FF2B5EF4-FFF2-40B4-BE49-F238E27FC236}">
-                <a16:creationId xmlns:a16="http://schemas.microsoft.com/office/drawing/2014/main" id="{DEEC4BBB-B54C-35B4-5790-8FC2CDAFE948}"/>
-              </a:ext>
-            </a:extLst>
-          </p:cNvPr>
-          <p:cNvSpPr>
-            <a:spLocks noGrp="1"/>
-          </p:cNvSpPr>
-          <p:nvPr>
-            <p:ph type="title"/>
-          </p:nvPr>
-        </p:nvSpPr>
-        <p:spPr/>
-        <p:txBody>
-          <a:bodyPr/>
-          <a:lstStyle/>
-          <a:p>
-            <a:r>
-              <a:rPr lang="en-US"/>
-              <a:t>🚀Targeted performance improvements</a:t>
-            </a:r>
-          </a:p>
-        </p:txBody>
-      </p:sp>
-      <p:sp>
-        <p:nvSpPr>
-          <p:cNvPr id="10" name="Content Placeholder 9">
-            <a:extLst>
-              <a:ext uri="{FF2B5EF4-FFF2-40B4-BE49-F238E27FC236}">
-                <a16:creationId xmlns:a16="http://schemas.microsoft.com/office/drawing/2014/main" id="{BF78491A-D7BE-4E5B-189C-19CB91E2E460}"/>
-              </a:ext>
-            </a:extLst>
-          </p:cNvPr>
-          <p:cNvSpPr>
-            <a:spLocks noGrp="1"/>
-          </p:cNvSpPr>
-          <p:nvPr>
-            <p:ph idx="1"/>
-          </p:nvPr>
-        </p:nvSpPr>
-        <p:spPr/>
-        <p:txBody>
-          <a:bodyPr>
-            <a:normAutofit/>
-          </a:bodyPr>
-          <a:lstStyle/>
-          <a:p>
-            <a:r>
-              <a:rPr lang="en-US" dirty="0"/>
-              <a:t>Releasing memory from Kestrel memory pool</a:t>
-            </a:r>
-          </a:p>
-          <a:p>
-            <a:r>
-              <a:rPr lang="en-US" dirty="0">
-                <a:ea typeface="+mn-lt"/>
-                <a:cs typeface="+mn-lt"/>
-              </a:rPr>
-              <a:t>API JSON deserialization performance</a:t>
-            </a:r>
-          </a:p>
-        </p:txBody>
-      </p:sp>
-    </p:spTree>
-    <p:extLst>
-      <p:ext uri="{BB962C8B-B14F-4D97-AF65-F5344CB8AC3E}">
-        <p14:creationId xmlns:p14="http://schemas.microsoft.com/office/powerpoint/2010/main" val="1006598204"/>
       </p:ext>
     </p:extLst>
   </p:cSld>

</xml_diff>